<commit_message>
Update Capstone I Presentation
</commit_message>
<xml_diff>
--- a/capstone_projects/capstone_I/06_Capstone_I_Pitch_Prediction_Slidedeck.pptx
+++ b/capstone_projects/capstone_I/06_Capstone_I_Pitch_Prediction_Slidedeck.pptx
@@ -13359,7 +13359,7 @@
         <p:spPr>
           <a:xfrm>
             <a:off x="2468880" y="3429000"/>
-            <a:ext cx="6555600" cy="1678320"/>
+            <a:ext cx="6555240" cy="1677960"/>
           </a:xfrm>
           <a:prstGeom prst="rect">
             <a:avLst/>
@@ -13419,7 +13419,7 @@
         <p:spPr>
           <a:xfrm>
             <a:off x="2468880" y="5108760"/>
-            <a:ext cx="6555600" cy="609480"/>
+            <a:ext cx="6555240" cy="609120"/>
           </a:xfrm>
           <a:prstGeom prst="rect">
             <a:avLst/>
@@ -13471,7 +13471,7 @@
         <p:spPr>
           <a:xfrm>
             <a:off x="2414880" y="5843520"/>
-            <a:ext cx="6545520" cy="830880"/>
+            <a:ext cx="6545160" cy="830520"/>
           </a:xfrm>
           <a:prstGeom prst="rect">
             <a:avLst/>
@@ -13572,7 +13572,7 @@
         <p:spPr>
           <a:xfrm>
             <a:off x="2128680" y="527760"/>
-            <a:ext cx="6516000" cy="762120"/>
+            <a:ext cx="6515640" cy="761760"/>
           </a:xfrm>
           <a:prstGeom prst="rect">
             <a:avLst/>
@@ -13621,7 +13621,7 @@
         <p:spPr>
           <a:xfrm>
             <a:off x="1371600" y="4937760"/>
-            <a:ext cx="7405920" cy="1442880"/>
+            <a:ext cx="7405560" cy="1442520"/>
           </a:xfrm>
           <a:prstGeom prst="rect">
             <a:avLst/>
@@ -13640,7 +13640,7 @@
         <p:txBody>
           <a:bodyPr lIns="90000" rIns="90000" tIns="45000" bIns="45000"/>
           <a:p>
-            <a:pPr marL="216000" indent="-215280">
+            <a:pPr marL="216000" indent="-214920">
               <a:lnSpc>
                 <a:spcPct val="100000"/>
               </a:lnSpc>
@@ -13676,7 +13676,7 @@
             </a:endParaRPr>
           </a:p>
           <a:p>
-            <a:pPr marL="216000" indent="-215280">
+            <a:pPr marL="216000" indent="-214920">
               <a:lnSpc>
                 <a:spcPct val="100000"/>
               </a:lnSpc>
@@ -13712,9 +13712,9 @@
         <p:grpSpPr>
           <a:xfrm>
             <a:off x="2926080" y="1527120"/>
-            <a:ext cx="4303440" cy="3236760"/>
+            <a:ext cx="4303080" cy="3236400"/>
             <a:chOff x="2926080" y="1527120"/>
-            <a:chExt cx="4303440" cy="3236760"/>
+            <a:chExt cx="4303080" cy="3236400"/>
           </a:xfrm>
         </p:grpSpPr>
         <p:pic>
@@ -13730,7 +13730,7 @@
           <p:spPr>
             <a:xfrm>
               <a:off x="2932560" y="1840320"/>
-              <a:ext cx="4296960" cy="2923560"/>
+              <a:ext cx="4296600" cy="2923200"/>
             </a:xfrm>
             <a:prstGeom prst="rect">
               <a:avLst/>
@@ -13752,7 +13752,7 @@
           <p:spPr>
             <a:xfrm>
               <a:off x="2926080" y="1527120"/>
-              <a:ext cx="4303440" cy="312480"/>
+              <a:ext cx="4303080" cy="312120"/>
             </a:xfrm>
             <a:prstGeom prst="rect">
               <a:avLst/>
@@ -13851,7 +13851,7 @@
         <p:spPr>
           <a:xfrm>
             <a:off x="2128680" y="527760"/>
-            <a:ext cx="6516000" cy="762120"/>
+            <a:ext cx="6515640" cy="761760"/>
           </a:xfrm>
           <a:prstGeom prst="rect">
             <a:avLst/>
@@ -13900,7 +13900,7 @@
         <p:spPr>
           <a:xfrm>
             <a:off x="1640160" y="1521360"/>
-            <a:ext cx="2559600" cy="2285280"/>
+            <a:ext cx="2559240" cy="2284920"/>
           </a:xfrm>
           <a:prstGeom prst="rect">
             <a:avLst/>
@@ -13929,7 +13929,7 @@
             <a:r>
               <a:rPr b="1" lang="en-US" sz="1800" spc="-1" strike="noStrike" u="sng">
                 <a:solidFill>
-                  <a:srgbClr val="000000"/>
+                  <a:srgbClr val="ffffff"/>
                 </a:solidFill>
                 <a:uFillTx/>
                 <a:latin typeface="Arial"/>
@@ -13938,6 +13938,9 @@
               <a:t>Past Events:</a:t>
             </a:r>
             <a:endParaRPr b="0" lang="en-US" sz="1800" spc="-1" strike="noStrike">
+              <a:solidFill>
+                <a:srgbClr val="ffffff"/>
+              </a:solidFill>
               <a:latin typeface="Arial"/>
             </a:endParaRPr>
           </a:p>
@@ -13958,6 +13961,9 @@
               <a:t>Pitch Type</a:t>
             </a:r>
             <a:endParaRPr b="0" lang="en-US" sz="1500" spc="-1" strike="noStrike">
+              <a:solidFill>
+                <a:srgbClr val="ffffff"/>
+              </a:solidFill>
               <a:latin typeface="Arial"/>
             </a:endParaRPr>
           </a:p>
@@ -13978,6 +13984,9 @@
               <a:t>Pitch Velocity</a:t>
             </a:r>
             <a:endParaRPr b="0" lang="en-US" sz="1500" spc="-1" strike="noStrike">
+              <a:solidFill>
+                <a:srgbClr val="ffffff"/>
+              </a:solidFill>
               <a:latin typeface="Arial"/>
             </a:endParaRPr>
           </a:p>
@@ -14008,6 +14017,9 @@
               <a:t>*</a:t>
             </a:r>
             <a:endParaRPr b="0" lang="en-US" sz="1500" spc="-1" strike="noStrike">
+              <a:solidFill>
+                <a:srgbClr val="ffffff"/>
+              </a:solidFill>
               <a:latin typeface="Arial"/>
             </a:endParaRPr>
           </a:p>
@@ -14038,6 +14050,9 @@
               <a:t>*</a:t>
             </a:r>
             <a:endParaRPr b="0" lang="en-US" sz="1500" spc="-1" strike="noStrike">
+              <a:solidFill>
+                <a:srgbClr val="ffffff"/>
+              </a:solidFill>
               <a:latin typeface="Arial"/>
             </a:endParaRPr>
           </a:p>
@@ -14068,6 +14083,9 @@
               <a:t>*</a:t>
             </a:r>
             <a:endParaRPr b="0" lang="en-US" sz="1500" spc="-1" strike="noStrike">
+              <a:solidFill>
+                <a:srgbClr val="ffffff"/>
+              </a:solidFill>
               <a:latin typeface="Arial"/>
             </a:endParaRPr>
           </a:p>
@@ -14098,6 +14116,9 @@
               <a:t>*</a:t>
             </a:r>
             <a:endParaRPr b="0" lang="en-US" sz="1500" spc="-1" strike="noStrike">
+              <a:solidFill>
+                <a:srgbClr val="ffffff"/>
+              </a:solidFill>
               <a:latin typeface="Arial"/>
             </a:endParaRPr>
           </a:p>
@@ -14128,6 +14149,9 @@
               <a:t>*</a:t>
             </a:r>
             <a:endParaRPr b="0" lang="en-US" sz="1500" spc="-1" strike="noStrike">
+              <a:solidFill>
+                <a:srgbClr val="ffffff"/>
+              </a:solidFill>
               <a:latin typeface="Arial"/>
             </a:endParaRPr>
           </a:p>
@@ -14158,6 +14182,9 @@
               <a:t>*</a:t>
             </a:r>
             <a:endParaRPr b="0" lang="en-US" sz="1500" spc="-1" strike="noStrike">
+              <a:solidFill>
+                <a:srgbClr val="ffffff"/>
+              </a:solidFill>
               <a:latin typeface="Arial"/>
             </a:endParaRPr>
           </a:p>
@@ -14188,6 +14215,9 @@
               <a:t>*</a:t>
             </a:r>
             <a:endParaRPr b="0" lang="en-US" sz="1500" spc="-1" strike="noStrike">
+              <a:solidFill>
+                <a:srgbClr val="ffffff"/>
+              </a:solidFill>
               <a:latin typeface="Arial"/>
             </a:endParaRPr>
           </a:p>
@@ -14198,6 +14228,9 @@
               </a:lnSpc>
             </a:pPr>
             <a:endParaRPr b="0" lang="en-US" sz="1500" spc="-1" strike="noStrike">
+              <a:solidFill>
+                <a:srgbClr val="ffffff"/>
+              </a:solidFill>
               <a:latin typeface="Arial"/>
             </a:endParaRPr>
           </a:p>
@@ -14208,6 +14241,9 @@
               </a:lnSpc>
             </a:pPr>
             <a:endParaRPr b="0" lang="en-US" sz="1500" spc="-1" strike="noStrike">
+              <a:solidFill>
+                <a:srgbClr val="ffffff"/>
+              </a:solidFill>
               <a:latin typeface="Arial"/>
             </a:endParaRPr>
           </a:p>
@@ -14222,7 +14258,7 @@
         <p:spPr>
           <a:xfrm>
             <a:off x="4098240" y="1626480"/>
-            <a:ext cx="4862160" cy="4862160"/>
+            <a:ext cx="4861800" cy="4861800"/>
           </a:xfrm>
           <a:prstGeom prst="rect">
             <a:avLst/>
@@ -14685,7 +14721,7 @@
         <p:spPr>
           <a:xfrm>
             <a:off x="1640160" y="3898080"/>
-            <a:ext cx="2559600" cy="2413440"/>
+            <a:ext cx="2559240" cy="2413080"/>
           </a:xfrm>
           <a:prstGeom prst="rect">
             <a:avLst/>
@@ -14977,7 +15013,7 @@
         <p:spPr>
           <a:xfrm>
             <a:off x="1573920" y="6348240"/>
-            <a:ext cx="2376720" cy="301320"/>
+            <a:ext cx="2376360" cy="300960"/>
           </a:xfrm>
           <a:prstGeom prst="rect">
             <a:avLst/>
@@ -15078,7 +15114,7 @@
         <p:spPr>
           <a:xfrm>
             <a:off x="601560" y="374760"/>
-            <a:ext cx="8092080" cy="762120"/>
+            <a:ext cx="8091720" cy="761760"/>
           </a:xfrm>
           <a:prstGeom prst="rect">
             <a:avLst/>
@@ -15133,7 +15169,7 @@
         <p:spPr>
           <a:xfrm>
             <a:off x="274320" y="3183840"/>
-            <a:ext cx="3355200" cy="1449000"/>
+            <a:ext cx="3354840" cy="1448640"/>
           </a:xfrm>
           <a:prstGeom prst="rect">
             <a:avLst/>
@@ -15159,7 +15195,7 @@
         <p:spPr>
           <a:xfrm>
             <a:off x="6145920" y="1335600"/>
-            <a:ext cx="2285280" cy="1828080"/>
+            <a:ext cx="2284920" cy="1827720"/>
           </a:xfrm>
           <a:prstGeom prst="rect">
             <a:avLst/>
@@ -15181,9 +15217,9 @@
         <p:grpSpPr>
           <a:xfrm>
             <a:off x="5689080" y="3225600"/>
-            <a:ext cx="3163320" cy="1828080"/>
+            <a:ext cx="3162960" cy="1827720"/>
             <a:chOff x="5689080" y="3225600"/>
-            <a:chExt cx="3163320" cy="1828080"/>
+            <a:chExt cx="3162960" cy="1827720"/>
           </a:xfrm>
         </p:grpSpPr>
         <p:pic>
@@ -15199,7 +15235,7 @@
           <p:spPr>
             <a:xfrm>
               <a:off x="7764840" y="3225600"/>
-              <a:ext cx="1087560" cy="1828080"/>
+              <a:ext cx="1087200" cy="1827720"/>
             </a:xfrm>
             <a:prstGeom prst="rect">
               <a:avLst/>
@@ -15218,9 +15254,9 @@
           <p:grpSpPr>
             <a:xfrm>
               <a:off x="5689080" y="3225600"/>
-              <a:ext cx="2075040" cy="1828080"/>
+              <a:ext cx="2074680" cy="1827720"/>
               <a:chOff x="5689080" y="3225600"/>
-              <a:chExt cx="2075040" cy="1828080"/>
+              <a:chExt cx="2074680" cy="1827720"/>
             </a:xfrm>
           </p:grpSpPr>
           <p:pic>
@@ -15236,7 +15272,7 @@
             <p:spPr>
               <a:xfrm>
                 <a:off x="5689080" y="3225600"/>
-                <a:ext cx="1041840" cy="1828080"/>
+                <a:ext cx="1041480" cy="1827720"/>
               </a:xfrm>
               <a:prstGeom prst="rect">
                 <a:avLst/>
@@ -15259,7 +15295,7 @@
             <p:spPr>
               <a:xfrm>
                 <a:off x="6731640" y="3225600"/>
-                <a:ext cx="1032480" cy="1828080"/>
+                <a:ext cx="1032120" cy="1827720"/>
               </a:xfrm>
               <a:prstGeom prst="rect">
                 <a:avLst/>
@@ -15280,9 +15316,9 @@
         <p:grpSpPr>
           <a:xfrm>
             <a:off x="274320" y="1299600"/>
-            <a:ext cx="2193840" cy="1828080"/>
+            <a:ext cx="2193480" cy="1827720"/>
             <a:chOff x="274320" y="1299600"/>
-            <a:chExt cx="2193840" cy="1828080"/>
+            <a:chExt cx="2193480" cy="1827720"/>
           </a:xfrm>
         </p:grpSpPr>
         <p:pic>
@@ -15298,7 +15334,7 @@
           <p:spPr>
             <a:xfrm>
               <a:off x="274320" y="1299600"/>
-              <a:ext cx="1023480" cy="1828080"/>
+              <a:ext cx="1023120" cy="1827720"/>
             </a:xfrm>
             <a:prstGeom prst="rect">
               <a:avLst/>
@@ -15324,7 +15360,7 @@
           <p:spPr>
             <a:xfrm>
               <a:off x="1380600" y="1299600"/>
-              <a:ext cx="1087560" cy="1828080"/>
+              <a:ext cx="1087200" cy="1827720"/>
             </a:xfrm>
             <a:prstGeom prst="rect">
               <a:avLst/>
@@ -15351,7 +15387,7 @@
         <p:spPr>
           <a:xfrm>
             <a:off x="274320" y="4846320"/>
-            <a:ext cx="1032480" cy="1828080"/>
+            <a:ext cx="1032120" cy="1827720"/>
           </a:xfrm>
           <a:prstGeom prst="rect">
             <a:avLst/>
@@ -15373,7 +15409,7 @@
         <p:spPr>
           <a:xfrm>
             <a:off x="2560320" y="1281600"/>
-            <a:ext cx="2468160" cy="1710720"/>
+            <a:ext cx="2467800" cy="1710360"/>
           </a:xfrm>
           <a:prstGeom prst="rect">
             <a:avLst/>
@@ -15648,7 +15684,7 @@
         <p:spPr>
           <a:xfrm>
             <a:off x="1371600" y="4847760"/>
-            <a:ext cx="2193840" cy="1826640"/>
+            <a:ext cx="2193480" cy="1826280"/>
           </a:xfrm>
           <a:prstGeom prst="rect">
             <a:avLst/>
@@ -15778,7 +15814,7 @@
         <p:spPr>
           <a:xfrm>
             <a:off x="3749040" y="3474720"/>
-            <a:ext cx="1553760" cy="1162080"/>
+            <a:ext cx="1553400" cy="1161720"/>
           </a:xfrm>
           <a:prstGeom prst="rect">
             <a:avLst/>
@@ -15905,7 +15941,7 @@
         <p:spPr>
           <a:xfrm>
             <a:off x="3783600" y="4847760"/>
-            <a:ext cx="5176800" cy="1826640"/>
+            <a:ext cx="5176440" cy="1826280"/>
           </a:xfrm>
           <a:prstGeom prst="rect">
             <a:avLst/>
@@ -16199,7 +16235,7 @@
         <p:spPr>
           <a:xfrm>
             <a:off x="2056680" y="424080"/>
-            <a:ext cx="6363360" cy="762120"/>
+            <a:ext cx="6363000" cy="761760"/>
           </a:xfrm>
           <a:prstGeom prst="rect">
             <a:avLst/>
@@ -16248,7 +16284,7 @@
         <p:spPr>
           <a:xfrm>
             <a:off x="1463040" y="5603040"/>
-            <a:ext cx="7314480" cy="289440"/>
+            <a:ext cx="7314120" cy="289080"/>
           </a:xfrm>
           <a:prstGeom prst="rect">
             <a:avLst/>
@@ -16297,9 +16333,9 @@
         <p:grpSpPr>
           <a:xfrm>
             <a:off x="3158640" y="1360800"/>
-            <a:ext cx="3659760" cy="4194720"/>
+            <a:ext cx="3659400" cy="4194360"/>
             <a:chOff x="3158640" y="1360800"/>
-            <a:chExt cx="3659760" cy="4194720"/>
+            <a:chExt cx="3659400" cy="4194360"/>
           </a:xfrm>
         </p:grpSpPr>
         <p:pic>
@@ -16315,7 +16351,7 @@
           <p:spPr>
             <a:xfrm>
               <a:off x="3158640" y="1360800"/>
-              <a:ext cx="1231920" cy="4194720"/>
+              <a:ext cx="1231560" cy="4194360"/>
             </a:xfrm>
             <a:prstGeom prst="rect">
               <a:avLst/>
@@ -16338,7 +16374,7 @@
           <p:spPr>
             <a:xfrm>
               <a:off x="4373280" y="1360800"/>
-              <a:ext cx="2445120" cy="4194720"/>
+              <a:ext cx="2444760" cy="4194360"/>
             </a:xfrm>
             <a:prstGeom prst="rect">
               <a:avLst/>
@@ -16358,7 +16394,7 @@
         <p:spPr>
           <a:xfrm>
             <a:off x="3178080" y="5963040"/>
-            <a:ext cx="3587760" cy="545400"/>
+            <a:ext cx="3587400" cy="545040"/>
           </a:xfrm>
           <a:prstGeom prst="rect">
             <a:avLst/>
@@ -16456,7 +16492,7 @@
         <p:spPr>
           <a:xfrm>
             <a:off x="2056680" y="424080"/>
-            <a:ext cx="6363360" cy="762120"/>
+            <a:ext cx="6363000" cy="761760"/>
           </a:xfrm>
           <a:prstGeom prst="rect">
             <a:avLst/>
@@ -16505,7 +16541,7 @@
         <p:spPr>
           <a:xfrm>
             <a:off x="5494320" y="2106000"/>
-            <a:ext cx="3385440" cy="1002240"/>
+            <a:ext cx="3385080" cy="1001880"/>
           </a:xfrm>
           <a:prstGeom prst="rect">
             <a:avLst/>
@@ -16579,7 +16615,7 @@
         <p:spPr>
           <a:xfrm>
             <a:off x="1532160" y="2107800"/>
-            <a:ext cx="3549960" cy="1183320"/>
+            <a:ext cx="3549600" cy="1182960"/>
           </a:xfrm>
           <a:prstGeom prst="rect">
             <a:avLst/>
@@ -16653,7 +16689,7 @@
         <p:spPr>
           <a:xfrm>
             <a:off x="2194560" y="1304640"/>
-            <a:ext cx="6308640" cy="706320"/>
+            <a:ext cx="6308280" cy="705960"/>
           </a:xfrm>
           <a:prstGeom prst="rect">
             <a:avLst/>
@@ -16708,7 +16744,7 @@
         <p:spPr>
           <a:xfrm>
             <a:off x="1297800" y="3059280"/>
-            <a:ext cx="3766680" cy="3108240"/>
+            <a:ext cx="3766320" cy="3107880"/>
           </a:xfrm>
           <a:prstGeom prst="rect">
             <a:avLst/>
@@ -16730,7 +16766,7 @@
         <p:spPr>
           <a:xfrm>
             <a:off x="1463040" y="6215040"/>
-            <a:ext cx="7314480" cy="289440"/>
+            <a:ext cx="7314120" cy="289080"/>
           </a:xfrm>
           <a:prstGeom prst="rect">
             <a:avLst/>
@@ -16843,7 +16879,7 @@
         <p:spPr>
           <a:xfrm>
             <a:off x="5276160" y="3059280"/>
-            <a:ext cx="3501360" cy="3108240"/>
+            <a:ext cx="3501000" cy="3107880"/>
           </a:xfrm>
           <a:prstGeom prst="rect">
             <a:avLst/>
@@ -16914,7 +16950,7 @@
         <p:spPr>
           <a:xfrm>
             <a:off x="2056680" y="424080"/>
-            <a:ext cx="6363360" cy="762120"/>
+            <a:ext cx="6363000" cy="761760"/>
           </a:xfrm>
           <a:prstGeom prst="rect">
             <a:avLst/>
@@ -16993,7 +17029,7 @@
         <p:spPr>
           <a:xfrm>
             <a:off x="1618560" y="1556640"/>
-            <a:ext cx="7302960" cy="587520"/>
+            <a:ext cx="7302600" cy="587160"/>
           </a:xfrm>
           <a:prstGeom prst="rect">
             <a:avLst/>
@@ -17730,7 +17766,7 @@
         <p:spPr>
           <a:xfrm>
             <a:off x="1463040" y="4430880"/>
-            <a:ext cx="7405920" cy="1713960"/>
+            <a:ext cx="7405560" cy="1713600"/>
           </a:xfrm>
           <a:prstGeom prst="rect">
             <a:avLst/>
@@ -17925,7 +17961,7 @@
         <p:spPr>
           <a:xfrm>
             <a:off x="2572560" y="4009680"/>
-            <a:ext cx="4977360" cy="289800"/>
+            <a:ext cx="4977000" cy="289440"/>
           </a:xfrm>
           <a:prstGeom prst="rect">
             <a:avLst/>
@@ -17994,7 +18030,7 @@
         <p:spPr>
           <a:xfrm>
             <a:off x="3524400" y="6145920"/>
-            <a:ext cx="3016800" cy="402120"/>
+            <a:ext cx="3016440" cy="401760"/>
           </a:xfrm>
           <a:prstGeom prst="rect">
             <a:avLst/>
@@ -18092,7 +18128,7 @@
         <p:spPr>
           <a:xfrm>
             <a:off x="2056680" y="424080"/>
-            <a:ext cx="6363360" cy="762120"/>
+            <a:ext cx="6363000" cy="761760"/>
           </a:xfrm>
           <a:prstGeom prst="rect">
             <a:avLst/>
@@ -18171,7 +18207,7 @@
         <p:spPr>
           <a:xfrm>
             <a:off x="1371600" y="1920240"/>
-            <a:ext cx="7588800" cy="1645200"/>
+            <a:ext cx="7588440" cy="1644840"/>
           </a:xfrm>
           <a:prstGeom prst="rect">
             <a:avLst/>
@@ -18486,7 +18522,7 @@
         <p:spPr>
           <a:xfrm>
             <a:off x="1679040" y="4311000"/>
-            <a:ext cx="4662720" cy="2216520"/>
+            <a:ext cx="4662360" cy="2216160"/>
           </a:xfrm>
           <a:prstGeom prst="rect">
             <a:avLst/>
@@ -18508,7 +18544,7 @@
         <p:spPr>
           <a:xfrm>
             <a:off x="6564240" y="4372560"/>
-            <a:ext cx="2010960" cy="2010960"/>
+            <a:ext cx="2010600" cy="2010600"/>
           </a:xfrm>
           <a:custGeom>
             <a:avLst/>
@@ -18775,7 +18811,7 @@
         <p:spPr>
           <a:xfrm>
             <a:off x="1607040" y="3700080"/>
-            <a:ext cx="6948720" cy="541440"/>
+            <a:ext cx="6948360" cy="541080"/>
           </a:xfrm>
           <a:prstGeom prst="rect">
             <a:avLst/>
@@ -18893,7 +18929,7 @@
         <p:spPr>
           <a:xfrm>
             <a:off x="601560" y="374760"/>
-            <a:ext cx="8092080" cy="762120"/>
+            <a:ext cx="8091720" cy="761760"/>
           </a:xfrm>
           <a:prstGeom prst="rect">
             <a:avLst/>
@@ -18944,7 +18980,7 @@
         <p:spPr>
           <a:xfrm>
             <a:off x="1113840" y="1609920"/>
-            <a:ext cx="7040160" cy="601560"/>
+            <a:ext cx="7039800" cy="601200"/>
           </a:xfrm>
           <a:prstGeom prst="rect">
             <a:avLst/>
@@ -18963,7 +18999,7 @@
         <p:txBody>
           <a:bodyPr lIns="90000" rIns="90000" tIns="45000" bIns="45000"/>
           <a:p>
-            <a:pPr marL="216000" indent="-215280">
+            <a:pPr marL="216000" indent="-214920">
               <a:lnSpc>
                 <a:spcPct val="100000"/>
               </a:lnSpc>
@@ -19009,7 +19045,7 @@
             </a:endParaRPr>
           </a:p>
           <a:p>
-            <a:pPr marL="216000" indent="-215280">
+            <a:pPr marL="216000" indent="-214920">
               <a:lnSpc>
                 <a:spcPct val="100000"/>
               </a:lnSpc>
@@ -19069,7 +19105,7 @@
         <p:spPr>
           <a:xfrm>
             <a:off x="1740240" y="2305440"/>
-            <a:ext cx="5760000" cy="4244400"/>
+            <a:ext cx="5759640" cy="4244040"/>
           </a:xfrm>
           <a:prstGeom prst="rect">
             <a:avLst/>
@@ -19140,7 +19176,7 @@
         <p:spPr>
           <a:xfrm>
             <a:off x="601560" y="374760"/>
-            <a:ext cx="8092080" cy="762120"/>
+            <a:ext cx="8091720" cy="761760"/>
           </a:xfrm>
           <a:prstGeom prst="rect">
             <a:avLst/>
@@ -19191,7 +19227,7 @@
         <p:spPr>
           <a:xfrm>
             <a:off x="3011760" y="1686600"/>
-            <a:ext cx="5870880" cy="693000"/>
+            <a:ext cx="5870520" cy="692640"/>
           </a:xfrm>
           <a:prstGeom prst="rect">
             <a:avLst/>
@@ -19264,7 +19300,7 @@
         <p:spPr>
           <a:xfrm>
             <a:off x="3103560" y="2576880"/>
-            <a:ext cx="5635080" cy="3440880"/>
+            <a:ext cx="5634720" cy="3440520"/>
           </a:xfrm>
           <a:prstGeom prst="rect">
             <a:avLst/>
@@ -19286,7 +19322,7 @@
         <p:spPr>
           <a:xfrm>
             <a:off x="182880" y="2723760"/>
-            <a:ext cx="2775960" cy="3199680"/>
+            <a:ext cx="2775600" cy="3199320"/>
           </a:xfrm>
           <a:prstGeom prst="rect">
             <a:avLst/>
@@ -19336,7 +19372,7 @@
             </a:endParaRPr>
           </a:p>
           <a:p>
-            <a:pPr marL="216000" indent="-215280">
+            <a:pPr marL="216000" indent="-214920">
               <a:lnSpc>
                 <a:spcPct val="100000"/>
               </a:lnSpc>
@@ -19436,7 +19472,7 @@
             </a:endParaRPr>
           </a:p>
           <a:p>
-            <a:pPr marL="216000" indent="-215280">
+            <a:pPr marL="216000" indent="-214920">
               <a:lnSpc>
                 <a:spcPct val="100000"/>
               </a:lnSpc>
@@ -19465,7 +19501,7 @@
             </a:endParaRPr>
           </a:p>
           <a:p>
-            <a:pPr marL="216000" indent="-215280">
+            <a:pPr marL="216000" indent="-214920">
               <a:lnSpc>
                 <a:spcPct val="100000"/>
               </a:lnSpc>
@@ -19494,7 +19530,7 @@
             </a:endParaRPr>
           </a:p>
           <a:p>
-            <a:pPr marL="216000" indent="-215280">
+            <a:pPr marL="216000" indent="-214920">
               <a:lnSpc>
                 <a:spcPct val="100000"/>
               </a:lnSpc>
@@ -19523,7 +19559,7 @@
             </a:endParaRPr>
           </a:p>
           <a:p>
-            <a:pPr marL="216000" indent="-215280">
+            <a:pPr marL="216000" indent="-214920">
               <a:lnSpc>
                 <a:spcPct val="100000"/>
               </a:lnSpc>
@@ -19562,7 +19598,7 @@
         <p:spPr>
           <a:xfrm>
             <a:off x="4003920" y="6146640"/>
-            <a:ext cx="3931200" cy="289440"/>
+            <a:ext cx="3930840" cy="289080"/>
           </a:xfrm>
           <a:prstGeom prst="rect">
             <a:avLst/>
@@ -19660,7 +19696,7 @@
         <p:spPr>
           <a:xfrm>
             <a:off x="601560" y="374760"/>
-            <a:ext cx="8092080" cy="762120"/>
+            <a:ext cx="8091720" cy="761760"/>
           </a:xfrm>
           <a:prstGeom prst="rect">
             <a:avLst/>
@@ -19711,7 +19747,7 @@
         <p:spPr>
           <a:xfrm>
             <a:off x="2723760" y="1407600"/>
-            <a:ext cx="6217200" cy="365040"/>
+            <a:ext cx="6216840" cy="364680"/>
           </a:xfrm>
           <a:prstGeom prst="rect">
             <a:avLst/>
@@ -19783,7 +19819,7 @@
         <p:spPr>
           <a:xfrm>
             <a:off x="3350160" y="5894640"/>
-            <a:ext cx="4937040" cy="344880"/>
+            <a:ext cx="4936680" cy="344520"/>
           </a:xfrm>
           <a:prstGeom prst="rect">
             <a:avLst/>
@@ -19836,7 +19872,7 @@
         <p:spPr>
           <a:xfrm>
             <a:off x="3113640" y="2011680"/>
-            <a:ext cx="5463360" cy="3748320"/>
+            <a:ext cx="5463000" cy="3747960"/>
           </a:xfrm>
           <a:prstGeom prst="rect">
             <a:avLst/>
@@ -19858,7 +19894,7 @@
         <p:spPr>
           <a:xfrm>
             <a:off x="91440" y="2831760"/>
-            <a:ext cx="2925360" cy="1913760"/>
+            <a:ext cx="2925000" cy="1913400"/>
           </a:xfrm>
           <a:prstGeom prst="rect">
             <a:avLst/>
@@ -19928,7 +19964,7 @@
             </a:endParaRPr>
           </a:p>
           <a:p>
-            <a:pPr marL="216000" indent="-215280">
+            <a:pPr marL="216000" indent="-214920">
               <a:lnSpc>
                 <a:spcPct val="100000"/>
               </a:lnSpc>
@@ -19967,7 +20003,7 @@
             </a:endParaRPr>
           </a:p>
           <a:p>
-            <a:pPr marL="216000" indent="-215280">
+            <a:pPr marL="216000" indent="-214920">
               <a:lnSpc>
                 <a:spcPct val="100000"/>
               </a:lnSpc>
@@ -20065,7 +20101,7 @@
         <p:spPr>
           <a:xfrm>
             <a:off x="601560" y="374760"/>
-            <a:ext cx="8092080" cy="762120"/>
+            <a:ext cx="8091720" cy="761760"/>
           </a:xfrm>
           <a:prstGeom prst="rect">
             <a:avLst/>
@@ -20116,7 +20152,7 @@
         <p:spPr>
           <a:xfrm>
             <a:off x="365760" y="1954080"/>
-            <a:ext cx="8411760" cy="4171680"/>
+            <a:ext cx="8411400" cy="4171320"/>
           </a:xfrm>
           <a:prstGeom prst="rect">
             <a:avLst/>
@@ -20137,7 +20173,7 @@
             <a:normAutofit/>
           </a:bodyPr>
           <a:p>
-            <a:pPr marL="432000" indent="-323280">
+            <a:pPr marL="432000" indent="-322920">
               <a:lnSpc>
                 <a:spcPct val="100000"/>
               </a:lnSpc>
@@ -20255,7 +20291,7 @@
             </a:endParaRPr>
           </a:p>
           <a:p>
-            <a:pPr marL="432000" indent="-323280">
+            <a:pPr marL="432000" indent="-322920">
               <a:lnSpc>
                 <a:spcPct val="100000"/>
               </a:lnSpc>
@@ -20344,7 +20380,7 @@
             </a:endParaRPr>
           </a:p>
           <a:p>
-            <a:pPr marL="432000" indent="-323280">
+            <a:pPr marL="432000" indent="-322920">
               <a:lnSpc>
                 <a:spcPct val="100000"/>
               </a:lnSpc>
@@ -20497,7 +20533,7 @@
         <p:spPr>
           <a:xfrm>
             <a:off x="601560" y="374760"/>
-            <a:ext cx="8092080" cy="762120"/>
+            <a:ext cx="8091720" cy="761760"/>
           </a:xfrm>
           <a:prstGeom prst="rect">
             <a:avLst/>
@@ -20548,7 +20584,7 @@
         <p:spPr>
           <a:xfrm>
             <a:off x="2286000" y="1463040"/>
-            <a:ext cx="6546960" cy="1005120"/>
+            <a:ext cx="6546600" cy="1004760"/>
           </a:xfrm>
           <a:prstGeom prst="rect">
             <a:avLst/>
@@ -20597,7 +20633,7 @@
         <p:spPr>
           <a:xfrm>
             <a:off x="2286000" y="2579040"/>
-            <a:ext cx="2468160" cy="1296360"/>
+            <a:ext cx="2467800" cy="1296000"/>
           </a:xfrm>
           <a:prstGeom prst="rect">
             <a:avLst/>
@@ -20616,7 +20652,7 @@
         <p:txBody>
           <a:bodyPr lIns="90000" rIns="90000" tIns="45000" bIns="45000"/>
           <a:p>
-            <a:pPr marL="216000" indent="-215280">
+            <a:pPr marL="216000" indent="-214920">
               <a:lnSpc>
                 <a:spcPct val="100000"/>
               </a:lnSpc>
@@ -20645,7 +20681,7 @@
             </a:endParaRPr>
           </a:p>
           <a:p>
-            <a:pPr marL="216000" indent="-215280">
+            <a:pPr marL="216000" indent="-214920">
               <a:lnSpc>
                 <a:spcPct val="100000"/>
               </a:lnSpc>
@@ -20674,7 +20710,7 @@
             </a:endParaRPr>
           </a:p>
           <a:p>
-            <a:pPr marL="216000" indent="-215280">
+            <a:pPr marL="216000" indent="-214920">
               <a:lnSpc>
                 <a:spcPct val="100000"/>
               </a:lnSpc>
@@ -20713,7 +20749,7 @@
         <p:spPr>
           <a:xfrm>
             <a:off x="4826880" y="2579040"/>
-            <a:ext cx="303840" cy="1077840"/>
+            <a:ext cx="303480" cy="1077480"/>
           </a:xfrm>
           <a:custGeom>
             <a:avLst/>
@@ -20778,7 +20814,7 @@
         <p:spPr>
           <a:xfrm>
             <a:off x="5058000" y="2687400"/>
-            <a:ext cx="3422880" cy="693000"/>
+            <a:ext cx="3422520" cy="692640"/>
           </a:xfrm>
           <a:prstGeom prst="rect">
             <a:avLst/>
@@ -20853,7 +20889,7 @@
         <p:spPr>
           <a:xfrm>
             <a:off x="731520" y="4019040"/>
-            <a:ext cx="7771680" cy="2506680"/>
+            <a:ext cx="7771320" cy="2506320"/>
           </a:xfrm>
           <a:prstGeom prst="rect">
             <a:avLst/>
@@ -21083,7 +21119,7 @@
         <p:spPr>
           <a:xfrm>
             <a:off x="601560" y="374760"/>
-            <a:ext cx="8092080" cy="762120"/>
+            <a:ext cx="8091720" cy="761760"/>
           </a:xfrm>
           <a:prstGeom prst="rect">
             <a:avLst/>
@@ -21154,7 +21190,7 @@
         <p:spPr>
           <a:xfrm>
             <a:off x="365760" y="2293920"/>
-            <a:ext cx="8411760" cy="3831840"/>
+            <a:ext cx="8411400" cy="3831480"/>
           </a:xfrm>
           <a:prstGeom prst="rect">
             <a:avLst/>
@@ -21362,7 +21398,7 @@
         <p:spPr>
           <a:xfrm>
             <a:off x="601560" y="374760"/>
-            <a:ext cx="8092080" cy="762120"/>
+            <a:ext cx="8091720" cy="761760"/>
           </a:xfrm>
           <a:prstGeom prst="rect">
             <a:avLst/>
@@ -21413,7 +21449,7 @@
         <p:spPr>
           <a:xfrm>
             <a:off x="551520" y="1887120"/>
-            <a:ext cx="8170560" cy="939600"/>
+            <a:ext cx="8170200" cy="939240"/>
           </a:xfrm>
           <a:prstGeom prst="rect">
             <a:avLst/>
@@ -21493,7 +21529,7 @@
         <p:spPr>
           <a:xfrm>
             <a:off x="551520" y="2859120"/>
-            <a:ext cx="8170560" cy="2948760"/>
+            <a:ext cx="8170200" cy="2948400"/>
           </a:xfrm>
           <a:prstGeom prst="rect">
             <a:avLst/>
@@ -21512,7 +21548,7 @@
         <p:txBody>
           <a:bodyPr lIns="90000" rIns="90000" tIns="45000" bIns="45000"/>
           <a:p>
-            <a:pPr marL="216000" indent="-215280">
+            <a:pPr marL="216000" indent="-214920">
               <a:lnSpc>
                 <a:spcPct val="100000"/>
               </a:lnSpc>
@@ -21541,7 +21577,7 @@
             </a:endParaRPr>
           </a:p>
           <a:p>
-            <a:pPr marL="216000" indent="-215280">
+            <a:pPr marL="216000" indent="-214920">
               <a:lnSpc>
                 <a:spcPct val="100000"/>
               </a:lnSpc>
@@ -21570,7 +21606,7 @@
             </a:endParaRPr>
           </a:p>
           <a:p>
-            <a:pPr lvl="1" marL="457200" indent="-216000">
+            <a:pPr lvl="1" marL="457200" indent="-215640">
               <a:lnSpc>
                 <a:spcPct val="100000"/>
               </a:lnSpc>
@@ -21598,7 +21634,7 @@
             </a:endParaRPr>
           </a:p>
           <a:p>
-            <a:pPr lvl="1" marL="457200" indent="-216000">
+            <a:pPr lvl="1" marL="457200" indent="-215640">
               <a:lnSpc>
                 <a:spcPct val="100000"/>
               </a:lnSpc>
@@ -21626,7 +21662,7 @@
             </a:endParaRPr>
           </a:p>
           <a:p>
-            <a:pPr lvl="1" marL="457200" indent="-216000">
+            <a:pPr lvl="1" marL="457200" indent="-215640">
               <a:lnSpc>
                 <a:spcPct val="100000"/>
               </a:lnSpc>
@@ -21654,7 +21690,7 @@
             </a:endParaRPr>
           </a:p>
           <a:p>
-            <a:pPr lvl="1" marL="457200" indent="-216000">
+            <a:pPr lvl="1" marL="457200" indent="-215640">
               <a:lnSpc>
                 <a:spcPct val="100000"/>
               </a:lnSpc>
@@ -21682,7 +21718,7 @@
             </a:endParaRPr>
           </a:p>
           <a:p>
-            <a:pPr lvl="1" marL="457200" indent="-216000">
+            <a:pPr lvl="1" marL="457200" indent="-215640">
               <a:lnSpc>
                 <a:spcPct val="100000"/>
               </a:lnSpc>
@@ -21710,7 +21746,7 @@
             </a:endParaRPr>
           </a:p>
           <a:p>
-            <a:pPr marL="216000" indent="-215280">
+            <a:pPr marL="216000" indent="-214920">
               <a:lnSpc>
                 <a:spcPct val="100000"/>
               </a:lnSpc>
@@ -21739,7 +21775,7 @@
             </a:endParaRPr>
           </a:p>
           <a:p>
-            <a:pPr marL="216000" indent="-215280">
+            <a:pPr marL="216000" indent="-214920">
               <a:lnSpc>
                 <a:spcPct val="100000"/>
               </a:lnSpc>
@@ -21768,7 +21804,7 @@
             </a:endParaRPr>
           </a:p>
           <a:p>
-            <a:pPr marL="216000" indent="-215280">
+            <a:pPr marL="216000" indent="-214920">
               <a:lnSpc>
                 <a:spcPct val="100000"/>
               </a:lnSpc>
@@ -21876,7 +21912,7 @@
         <p:spPr>
           <a:xfrm>
             <a:off x="601560" y="374760"/>
-            <a:ext cx="8092080" cy="762120"/>
+            <a:ext cx="8091720" cy="761760"/>
           </a:xfrm>
           <a:prstGeom prst="rect">
             <a:avLst/>
@@ -21927,7 +21963,7 @@
         <p:spPr>
           <a:xfrm>
             <a:off x="127440" y="3078000"/>
-            <a:ext cx="2742480" cy="1762560"/>
+            <a:ext cx="2742120" cy="1762200"/>
           </a:xfrm>
           <a:prstGeom prst="rect">
             <a:avLst/>
@@ -21970,7 +22006,7 @@
             </a:endParaRPr>
           </a:p>
           <a:p>
-            <a:pPr marL="216000" indent="-215280">
+            <a:pPr marL="216000" indent="-214920">
               <a:lnSpc>
                 <a:spcPct val="100000"/>
               </a:lnSpc>
@@ -21999,7 +22035,7 @@
             </a:endParaRPr>
           </a:p>
           <a:p>
-            <a:pPr marL="216000" indent="-215280">
+            <a:pPr marL="216000" indent="-214920">
               <a:lnSpc>
                 <a:spcPct val="100000"/>
               </a:lnSpc>
@@ -22028,7 +22064,7 @@
             </a:endParaRPr>
           </a:p>
           <a:p>
-            <a:pPr marL="216000" indent="-215280">
+            <a:pPr marL="216000" indent="-214920">
               <a:lnSpc>
                 <a:spcPct val="100000"/>
               </a:lnSpc>
@@ -22071,7 +22107,7 @@
         <p:spPr>
           <a:xfrm>
             <a:off x="2926080" y="2362680"/>
-            <a:ext cx="5992920" cy="3903120"/>
+            <a:ext cx="5992560" cy="3902760"/>
           </a:xfrm>
           <a:prstGeom prst="rect">
             <a:avLst/>
@@ -22093,7 +22129,7 @@
         <p:spPr>
           <a:xfrm>
             <a:off x="2867760" y="6290640"/>
-            <a:ext cx="6125760" cy="322560"/>
+            <a:ext cx="6125400" cy="322200"/>
           </a:xfrm>
           <a:prstGeom prst="rect">
             <a:avLst/>
@@ -22142,7 +22178,7 @@
         <p:spPr>
           <a:xfrm>
             <a:off x="2795760" y="1753920"/>
-            <a:ext cx="6217200" cy="527760"/>
+            <a:ext cx="6216840" cy="527400"/>
           </a:xfrm>
           <a:prstGeom prst="rect">
             <a:avLst/>
@@ -22240,7 +22276,7 @@
         <p:spPr>
           <a:xfrm>
             <a:off x="601560" y="374760"/>
-            <a:ext cx="8092080" cy="762120"/>
+            <a:ext cx="8091720" cy="761760"/>
           </a:xfrm>
           <a:prstGeom prst="rect">
             <a:avLst/>
@@ -22295,7 +22331,7 @@
         <p:spPr>
           <a:xfrm>
             <a:off x="2560320" y="1668240"/>
-            <a:ext cx="4310280" cy="1081800"/>
+            <a:ext cx="4309920" cy="1081440"/>
           </a:xfrm>
           <a:prstGeom prst="rect">
             <a:avLst/>
@@ -22317,7 +22353,7 @@
         <p:spPr>
           <a:xfrm>
             <a:off x="1368720" y="3054600"/>
-            <a:ext cx="6857280" cy="3310200"/>
+            <a:ext cx="6856920" cy="3309840"/>
           </a:xfrm>
           <a:prstGeom prst="rect">
             <a:avLst/>
@@ -22927,7 +22963,7 @@
         <p:spPr>
           <a:xfrm>
             <a:off x="601560" y="374760"/>
-            <a:ext cx="8092080" cy="762120"/>
+            <a:ext cx="8091720" cy="761760"/>
           </a:xfrm>
           <a:prstGeom prst="rect">
             <a:avLst/>
@@ -22978,7 +23014,7 @@
         <p:spPr>
           <a:xfrm>
             <a:off x="2493360" y="1465920"/>
-            <a:ext cx="4541040" cy="910800"/>
+            <a:ext cx="4540680" cy="910440"/>
           </a:xfrm>
           <a:prstGeom prst="rect">
             <a:avLst/>
@@ -23018,7 +23054,7 @@
             </a:endParaRPr>
           </a:p>
           <a:p>
-            <a:pPr marL="216000" indent="-215280">
+            <a:pPr marL="216000" indent="-214920">
               <a:lnSpc>
                 <a:spcPct val="100000"/>
               </a:lnSpc>
@@ -23047,7 +23083,7 @@
             </a:endParaRPr>
           </a:p>
           <a:p>
-            <a:pPr marL="216000" indent="-215280">
+            <a:pPr marL="216000" indent="-214920">
               <a:lnSpc>
                 <a:spcPct val="100000"/>
               </a:lnSpc>
@@ -23086,7 +23122,7 @@
         <p:spPr>
           <a:xfrm>
             <a:off x="1005840" y="2527560"/>
-            <a:ext cx="7040160" cy="306360"/>
+            <a:ext cx="7039800" cy="306000"/>
           </a:xfrm>
           <a:prstGeom prst="rect">
             <a:avLst/>
@@ -23135,9 +23171,9 @@
         <p:grpSpPr>
           <a:xfrm>
             <a:off x="825840" y="2855520"/>
-            <a:ext cx="7413840" cy="3108240"/>
+            <a:ext cx="7413480" cy="3107880"/>
             <a:chOff x="825840" y="2855520"/>
-            <a:chExt cx="7413840" cy="3108240"/>
+            <a:chExt cx="7413480" cy="3107880"/>
           </a:xfrm>
         </p:grpSpPr>
         <p:pic>
@@ -23153,7 +23189,7 @@
           <p:spPr>
             <a:xfrm>
               <a:off x="825840" y="2855520"/>
-              <a:ext cx="3528720" cy="3108240"/>
+              <a:ext cx="3528360" cy="3107880"/>
             </a:xfrm>
             <a:prstGeom prst="rect">
               <a:avLst/>
@@ -23179,7 +23215,7 @@
           <p:spPr>
             <a:xfrm>
               <a:off x="4528080" y="2855520"/>
-              <a:ext cx="3711600" cy="3108240"/>
+              <a:ext cx="3711240" cy="3107880"/>
             </a:xfrm>
             <a:prstGeom prst="rect">
               <a:avLst/>
@@ -23251,7 +23287,7 @@
         <p:spPr>
           <a:xfrm>
             <a:off x="601560" y="374760"/>
-            <a:ext cx="8092080" cy="762120"/>
+            <a:ext cx="8091720" cy="761760"/>
           </a:xfrm>
           <a:prstGeom prst="rect">
             <a:avLst/>
@@ -23306,7 +23342,7 @@
         <p:spPr>
           <a:xfrm>
             <a:off x="2560320" y="1668240"/>
-            <a:ext cx="4310280" cy="1081800"/>
+            <a:ext cx="4309920" cy="1081440"/>
           </a:xfrm>
           <a:prstGeom prst="rect">
             <a:avLst/>
@@ -23328,7 +23364,7 @@
         <p:spPr>
           <a:xfrm>
             <a:off x="640080" y="2906280"/>
-            <a:ext cx="8046000" cy="3566160"/>
+            <a:ext cx="8045640" cy="3565800"/>
           </a:xfrm>
           <a:prstGeom prst="rect">
             <a:avLst/>
@@ -23718,7 +23754,7 @@
         <p:spPr>
           <a:xfrm>
             <a:off x="601560" y="374760"/>
-            <a:ext cx="8092080" cy="762120"/>
+            <a:ext cx="8091720" cy="761760"/>
           </a:xfrm>
           <a:prstGeom prst="rect">
             <a:avLst/>
@@ -23773,7 +23809,7 @@
         <p:spPr>
           <a:xfrm>
             <a:off x="667080" y="2247120"/>
-            <a:ext cx="3992760" cy="1572120"/>
+            <a:ext cx="3992400" cy="1571760"/>
           </a:xfrm>
           <a:prstGeom prst="rect">
             <a:avLst/>
@@ -23799,7 +23835,7 @@
         <p:spPr>
           <a:xfrm>
             <a:off x="4991040" y="1609920"/>
-            <a:ext cx="3528720" cy="3108240"/>
+            <a:ext cx="3528360" cy="3107880"/>
           </a:xfrm>
           <a:prstGeom prst="rect">
             <a:avLst/>
@@ -23820,7 +23856,7 @@
         </p:nvGraphicFramePr>
         <p:xfrm>
           <a:off x="507960" y="5053320"/>
-          <a:ext cx="5119920" cy="1554480"/>
+          <a:ext cx="5119920" cy="1554120"/>
         </p:xfrm>
         <a:graphic>
           <a:graphicData uri="http://schemas.openxmlformats.org/drawingml/2006/table">
@@ -24946,7 +24982,7 @@
                   </a:tcPr>
                 </a:tc>
               </a:tr>
-              <a:tr h="318240">
+              <a:tr h="317880">
                 <a:tc>
                   <a:txBody>
                     <a:bodyPr lIns="90000" rIns="90000"/>
@@ -25237,7 +25273,7 @@
         <p:spPr>
           <a:xfrm>
             <a:off x="404640" y="4732560"/>
-            <a:ext cx="3382560" cy="289440"/>
+            <a:ext cx="3382200" cy="289080"/>
           </a:xfrm>
           <a:prstGeom prst="rect">
             <a:avLst/>
@@ -25286,7 +25322,7 @@
         <p:spPr>
           <a:xfrm>
             <a:off x="5807880" y="4993200"/>
-            <a:ext cx="533880" cy="1645200"/>
+            <a:ext cx="533520" cy="1644840"/>
           </a:xfrm>
           <a:custGeom>
             <a:avLst/>
@@ -25351,7 +25387,7 @@
         <p:spPr>
           <a:xfrm>
             <a:off x="6495120" y="5486400"/>
-            <a:ext cx="2010960" cy="639360"/>
+            <a:ext cx="2010600" cy="639000"/>
           </a:xfrm>
           <a:prstGeom prst="rect">
             <a:avLst/>
@@ -25424,7 +25460,7 @@
         <p:spPr>
           <a:xfrm>
             <a:off x="692640" y="1924560"/>
-            <a:ext cx="3970080" cy="489240"/>
+            <a:ext cx="3969720" cy="488880"/>
           </a:xfrm>
           <a:prstGeom prst="rect">
             <a:avLst/>
@@ -25522,7 +25558,7 @@
         <p:spPr>
           <a:xfrm>
             <a:off x="997560" y="374760"/>
-            <a:ext cx="8092080" cy="762120"/>
+            <a:ext cx="8091720" cy="761760"/>
           </a:xfrm>
           <a:prstGeom prst="rect">
             <a:avLst/>
@@ -25573,7 +25609,7 @@
         <p:spPr>
           <a:xfrm>
             <a:off x="1172160" y="1685160"/>
-            <a:ext cx="7497360" cy="1295640"/>
+            <a:ext cx="7497000" cy="1295280"/>
           </a:xfrm>
           <a:prstGeom prst="rect">
             <a:avLst/>
@@ -25592,7 +25628,7 @@
         <p:txBody>
           <a:bodyPr lIns="90000" rIns="90000" tIns="45000" bIns="45000"/>
           <a:p>
-            <a:pPr marL="216000" indent="-215280">
+            <a:pPr marL="216000" indent="-214920">
               <a:lnSpc>
                 <a:spcPct val="100000"/>
               </a:lnSpc>
@@ -25628,7 +25664,7 @@
             </a:endParaRPr>
           </a:p>
           <a:p>
-            <a:pPr marL="216000" indent="-215280">
+            <a:pPr marL="216000" indent="-214920">
               <a:lnSpc>
                 <a:spcPct val="100000"/>
               </a:lnSpc>
@@ -25674,7 +25710,7 @@
         <p:spPr>
           <a:xfrm>
             <a:off x="1172160" y="6015600"/>
-            <a:ext cx="7497360" cy="456480"/>
+            <a:ext cx="7497000" cy="456120"/>
           </a:xfrm>
           <a:prstGeom prst="rect">
             <a:avLst/>
@@ -25693,7 +25729,7 @@
         <p:txBody>
           <a:bodyPr lIns="90000" rIns="90000" tIns="45000" bIns="45000"/>
           <a:p>
-            <a:pPr marL="216000" indent="-215280">
+            <a:pPr marL="216000" indent="-214920">
               <a:lnSpc>
                 <a:spcPct val="100000"/>
               </a:lnSpc>
@@ -25733,7 +25769,7 @@
         <p:spPr>
           <a:xfrm>
             <a:off x="1975320" y="3053520"/>
-            <a:ext cx="5992920" cy="2920680"/>
+            <a:ext cx="5992560" cy="2920320"/>
           </a:xfrm>
           <a:prstGeom prst="rect">
             <a:avLst/>
@@ -25755,7 +25791,7 @@
         <p:spPr>
           <a:xfrm>
             <a:off x="202320" y="3998160"/>
-            <a:ext cx="1645200" cy="730800"/>
+            <a:ext cx="1644840" cy="730440"/>
           </a:xfrm>
           <a:prstGeom prst="rect">
             <a:avLst/>
@@ -25853,7 +25889,7 @@
         <p:spPr>
           <a:xfrm>
             <a:off x="997560" y="374760"/>
-            <a:ext cx="8092080" cy="762120"/>
+            <a:ext cx="8091720" cy="761760"/>
           </a:xfrm>
           <a:prstGeom prst="rect">
             <a:avLst/>
@@ -25934,7 +25970,7 @@
         <p:spPr>
           <a:xfrm>
             <a:off x="1280160" y="4563000"/>
-            <a:ext cx="6765840" cy="1562760"/>
+            <a:ext cx="6765480" cy="1562400"/>
           </a:xfrm>
           <a:prstGeom prst="rect">
             <a:avLst/>
@@ -25953,7 +25989,7 @@
         <p:txBody>
           <a:bodyPr lIns="90000" rIns="90000" tIns="45000" bIns="45000"/>
           <a:p>
-            <a:pPr marL="216000" indent="-215280">
+            <a:pPr marL="216000" indent="-214920">
               <a:lnSpc>
                 <a:spcPct val="100000"/>
               </a:lnSpc>
@@ -25982,7 +26018,7 @@
             </a:endParaRPr>
           </a:p>
           <a:p>
-            <a:pPr marL="216000" indent="-215280">
+            <a:pPr marL="216000" indent="-214920">
               <a:lnSpc>
                 <a:spcPct val="100000"/>
               </a:lnSpc>
@@ -26011,7 +26047,7 @@
             </a:endParaRPr>
           </a:p>
           <a:p>
-            <a:pPr marL="216000" indent="-215280">
+            <a:pPr marL="216000" indent="-214920">
               <a:lnSpc>
                 <a:spcPct val="100000"/>
               </a:lnSpc>
@@ -26050,7 +26086,7 @@
             </a:endParaRPr>
           </a:p>
           <a:p>
-            <a:pPr marL="216000" indent="-215280">
+            <a:pPr marL="216000" indent="-214920">
               <a:lnSpc>
                 <a:spcPct val="100000"/>
               </a:lnSpc>
@@ -26103,7 +26139,7 @@
         <p:spPr>
           <a:xfrm>
             <a:off x="2125080" y="1583280"/>
-            <a:ext cx="5244840" cy="2619360"/>
+            <a:ext cx="5244480" cy="2619000"/>
           </a:xfrm>
           <a:prstGeom prst="rect">
             <a:avLst/>
@@ -26125,7 +26161,7 @@
         <p:spPr>
           <a:xfrm>
             <a:off x="4608000" y="2707200"/>
-            <a:ext cx="456480" cy="456480"/>
+            <a:ext cx="456120" cy="456120"/>
           </a:xfrm>
           <a:prstGeom prst="ellipse">
             <a:avLst/>
@@ -26182,7 +26218,7 @@
         <p:spPr>
           <a:xfrm>
             <a:off x="4389120" y="2011680"/>
-            <a:ext cx="2010960" cy="747360"/>
+            <a:ext cx="2010600" cy="747000"/>
           </a:xfrm>
           <a:prstGeom prst="rect">
             <a:avLst/>
@@ -26323,7 +26359,7 @@
         <p:spPr>
           <a:xfrm>
             <a:off x="601560" y="374760"/>
-            <a:ext cx="8092080" cy="762120"/>
+            <a:ext cx="8091720" cy="761760"/>
           </a:xfrm>
           <a:prstGeom prst="rect">
             <a:avLst/>
@@ -26374,7 +26410,7 @@
         <p:spPr>
           <a:xfrm>
             <a:off x="731520" y="3687120"/>
-            <a:ext cx="3659760" cy="539640"/>
+            <a:ext cx="3659400" cy="539280"/>
           </a:xfrm>
           <a:prstGeom prst="rect">
             <a:avLst/>
@@ -26425,7 +26461,7 @@
         <p:spPr>
           <a:xfrm>
             <a:off x="4494240" y="2936520"/>
-            <a:ext cx="4015080" cy="2366280"/>
+            <a:ext cx="4014720" cy="2365920"/>
           </a:xfrm>
           <a:prstGeom prst="rect">
             <a:avLst/>
@@ -26446,7 +26482,7 @@
             <a:normAutofit/>
           </a:bodyPr>
           <a:p>
-            <a:pPr marL="432000" indent="-323280">
+            <a:pPr marL="432000" indent="-322920">
               <a:lnSpc>
                 <a:spcPct val="115000"/>
               </a:lnSpc>
@@ -26475,7 +26511,7 @@
             </a:endParaRPr>
           </a:p>
           <a:p>
-            <a:pPr marL="432000" indent="-323280">
+            <a:pPr marL="432000" indent="-322920">
               <a:lnSpc>
                 <a:spcPct val="115000"/>
               </a:lnSpc>
@@ -26504,7 +26540,7 @@
             </a:endParaRPr>
           </a:p>
           <a:p>
-            <a:pPr marL="432000" indent="-323280">
+            <a:pPr marL="432000" indent="-322920">
               <a:lnSpc>
                 <a:spcPct val="115000"/>
               </a:lnSpc>
@@ -26533,7 +26569,7 @@
             </a:endParaRPr>
           </a:p>
           <a:p>
-            <a:pPr marL="432000" indent="-323280">
+            <a:pPr marL="432000" indent="-322920">
               <a:lnSpc>
                 <a:spcPct val="115000"/>
               </a:lnSpc>
@@ -26651,7 +26687,7 @@
         <p:spPr>
           <a:xfrm>
             <a:off x="997560" y="374760"/>
-            <a:ext cx="8092080" cy="762120"/>
+            <a:ext cx="8091720" cy="761760"/>
           </a:xfrm>
           <a:prstGeom prst="rect">
             <a:avLst/>
@@ -26722,7 +26758,7 @@
         <p:spPr>
           <a:xfrm>
             <a:off x="2394000" y="5852160"/>
-            <a:ext cx="4662720" cy="374040"/>
+            <a:ext cx="4662360" cy="373680"/>
           </a:xfrm>
           <a:prstGeom prst="rect">
             <a:avLst/>
@@ -26741,7 +26777,7 @@
         <p:txBody>
           <a:bodyPr lIns="90000" rIns="90000" tIns="45000" bIns="45000"/>
           <a:p>
-            <a:pPr marL="216000" indent="-215280">
+            <a:pPr marL="216000" indent="-214920">
               <a:lnSpc>
                 <a:spcPct val="100000"/>
               </a:lnSpc>
@@ -26784,7 +26820,7 @@
         <p:spPr>
           <a:xfrm>
             <a:off x="849240" y="1892520"/>
-            <a:ext cx="7612920" cy="3861720"/>
+            <a:ext cx="7612560" cy="3861360"/>
           </a:xfrm>
           <a:prstGeom prst="rect">
             <a:avLst/>
@@ -26855,7 +26891,7 @@
         <p:spPr>
           <a:xfrm>
             <a:off x="601560" y="374760"/>
-            <a:ext cx="8075520" cy="762120"/>
+            <a:ext cx="8075160" cy="761760"/>
           </a:xfrm>
           <a:prstGeom prst="rect">
             <a:avLst/>
@@ -26910,7 +26946,7 @@
         <p:spPr>
           <a:xfrm>
             <a:off x="2546640" y="1962360"/>
-            <a:ext cx="5756400" cy="2984400"/>
+            <a:ext cx="5756040" cy="2984040"/>
           </a:xfrm>
           <a:prstGeom prst="rect">
             <a:avLst/>
@@ -26932,7 +26968,7 @@
         <p:spPr>
           <a:xfrm>
             <a:off x="1758960" y="5074200"/>
-            <a:ext cx="7290000" cy="996120"/>
+            <a:ext cx="7289640" cy="995760"/>
           </a:xfrm>
           <a:prstGeom prst="rect">
             <a:avLst/>
@@ -26951,7 +26987,7 @@
         <p:txBody>
           <a:bodyPr lIns="90000" rIns="90000" tIns="45000" bIns="45000"/>
           <a:p>
-            <a:pPr marL="216000" indent="-215280">
+            <a:pPr marL="216000" indent="-214920">
               <a:lnSpc>
                 <a:spcPct val="100000"/>
               </a:lnSpc>
@@ -26980,7 +27016,7 @@
             </a:endParaRPr>
           </a:p>
           <a:p>
-            <a:pPr marL="216000" indent="-215280">
+            <a:pPr marL="216000" indent="-214920">
               <a:lnSpc>
                 <a:spcPct val="100000"/>
               </a:lnSpc>
@@ -27009,7 +27045,7 @@
             </a:endParaRPr>
           </a:p>
           <a:p>
-            <a:pPr marL="216000" indent="-215280">
+            <a:pPr marL="216000" indent="-214920">
               <a:lnSpc>
                 <a:spcPct val="100000"/>
               </a:lnSpc>
@@ -27048,7 +27084,7 @@
         <p:spPr>
           <a:xfrm>
             <a:off x="2676240" y="1316520"/>
-            <a:ext cx="5485680" cy="608040"/>
+            <a:ext cx="5485320" cy="607680"/>
           </a:xfrm>
           <a:prstGeom prst="rect">
             <a:avLst/>
@@ -27123,7 +27159,7 @@
         <p:spPr>
           <a:xfrm>
             <a:off x="274320" y="2252880"/>
-            <a:ext cx="2102400" cy="1775520"/>
+            <a:ext cx="2102040" cy="1775160"/>
           </a:xfrm>
           <a:prstGeom prst="rect">
             <a:avLst/>
@@ -27363,7 +27399,7 @@
         <p:spPr>
           <a:xfrm>
             <a:off x="601560" y="374760"/>
-            <a:ext cx="8075520" cy="762120"/>
+            <a:ext cx="8075160" cy="761760"/>
           </a:xfrm>
           <a:prstGeom prst="rect">
             <a:avLst/>
@@ -27414,7 +27450,7 @@
         <p:spPr>
           <a:xfrm>
             <a:off x="1758960" y="5074200"/>
-            <a:ext cx="7290000" cy="1211760"/>
+            <a:ext cx="7289640" cy="1211400"/>
           </a:xfrm>
           <a:prstGeom prst="rect">
             <a:avLst/>
@@ -27433,7 +27469,7 @@
         <p:txBody>
           <a:bodyPr lIns="90000" rIns="90000" tIns="45000" bIns="45000"/>
           <a:p>
-            <a:pPr marL="216000" indent="-215280">
+            <a:pPr marL="216000" indent="-214920">
               <a:lnSpc>
                 <a:spcPct val="100000"/>
               </a:lnSpc>
@@ -27462,7 +27498,7 @@
             </a:endParaRPr>
           </a:p>
           <a:p>
-            <a:pPr marL="216000" indent="-215280">
+            <a:pPr marL="216000" indent="-214920">
               <a:lnSpc>
                 <a:spcPct val="100000"/>
               </a:lnSpc>
@@ -27491,7 +27527,7 @@
             </a:endParaRPr>
           </a:p>
           <a:p>
-            <a:pPr marL="216000" indent="-215280">
+            <a:pPr marL="216000" indent="-214920">
               <a:lnSpc>
                 <a:spcPct val="100000"/>
               </a:lnSpc>
@@ -27520,7 +27556,7 @@
             </a:endParaRPr>
           </a:p>
           <a:p>
-            <a:pPr marL="216000" indent="-215280">
+            <a:pPr marL="216000" indent="-214920">
               <a:lnSpc>
                 <a:spcPct val="100000"/>
               </a:lnSpc>
@@ -27559,7 +27595,7 @@
         <p:spPr>
           <a:xfrm>
             <a:off x="2676240" y="1316520"/>
-            <a:ext cx="5485680" cy="608040"/>
+            <a:ext cx="5485320" cy="607680"/>
           </a:xfrm>
           <a:prstGeom prst="rect">
             <a:avLst/>
@@ -27634,7 +27670,7 @@
         <p:spPr>
           <a:xfrm>
             <a:off x="274320" y="2252880"/>
-            <a:ext cx="2102400" cy="1775520"/>
+            <a:ext cx="2102040" cy="1775160"/>
           </a:xfrm>
           <a:prstGeom prst="rect">
             <a:avLst/>
@@ -27829,7 +27865,7 @@
         <p:spPr>
           <a:xfrm>
             <a:off x="2554560" y="1939680"/>
-            <a:ext cx="5760000" cy="2989440"/>
+            <a:ext cx="5759640" cy="2989080"/>
           </a:xfrm>
           <a:prstGeom prst="rect">
             <a:avLst/>
@@ -27900,7 +27936,7 @@
         <p:spPr>
           <a:xfrm>
             <a:off x="601560" y="374760"/>
-            <a:ext cx="8075520" cy="762120"/>
+            <a:ext cx="8075160" cy="761760"/>
           </a:xfrm>
           <a:prstGeom prst="rect">
             <a:avLst/>
@@ -27951,7 +27987,7 @@
         <p:spPr>
           <a:xfrm>
             <a:off x="731520" y="1939680"/>
-            <a:ext cx="7771680" cy="4102920"/>
+            <a:ext cx="7771320" cy="4102560"/>
           </a:xfrm>
           <a:prstGeom prst="rect">
             <a:avLst/>
@@ -27970,7 +28006,7 @@
         <p:txBody>
           <a:bodyPr lIns="90000" rIns="90000" tIns="45000" bIns="45000"/>
           <a:p>
-            <a:pPr marL="216000" indent="-215280">
+            <a:pPr marL="216000" indent="-214920">
               <a:lnSpc>
                 <a:spcPct val="100000"/>
               </a:lnSpc>
@@ -28002,7 +28038,7 @@
             </a:endParaRPr>
           </a:p>
           <a:p>
-            <a:pPr marL="216000" indent="-215280">
+            <a:pPr marL="216000" indent="-214920">
               <a:lnSpc>
                 <a:spcPct val="100000"/>
               </a:lnSpc>
@@ -28034,7 +28070,7 @@
             </a:endParaRPr>
           </a:p>
           <a:p>
-            <a:pPr marL="216000" indent="-215280">
+            <a:pPr marL="216000" indent="-214920">
               <a:lnSpc>
                 <a:spcPct val="100000"/>
               </a:lnSpc>
@@ -28065,7 +28101,7 @@
             </a:endParaRPr>
           </a:p>
           <a:p>
-            <a:pPr marL="216000" indent="-215280">
+            <a:pPr marL="216000" indent="-214920">
               <a:lnSpc>
                 <a:spcPct val="100000"/>
               </a:lnSpc>
@@ -28096,7 +28132,7 @@
             </a:endParaRPr>
           </a:p>
           <a:p>
-            <a:pPr marL="216000" indent="-215280">
+            <a:pPr marL="216000" indent="-214920">
               <a:lnSpc>
                 <a:spcPct val="100000"/>
               </a:lnSpc>
@@ -28186,7 +28222,7 @@
         <p:spPr>
           <a:xfrm>
             <a:off x="601560" y="374760"/>
-            <a:ext cx="8075520" cy="762120"/>
+            <a:ext cx="8075160" cy="761760"/>
           </a:xfrm>
           <a:prstGeom prst="rect">
             <a:avLst/>
@@ -28237,7 +28273,7 @@
         <p:spPr>
           <a:xfrm>
             <a:off x="731520" y="2335680"/>
-            <a:ext cx="7771680" cy="3021480"/>
+            <a:ext cx="7771320" cy="3021120"/>
           </a:xfrm>
           <a:prstGeom prst="rect">
             <a:avLst/>
@@ -28256,7 +28292,7 @@
         <p:txBody>
           <a:bodyPr lIns="90000" rIns="90000" tIns="45000" bIns="45000"/>
           <a:p>
-            <a:pPr marL="216000" indent="-215280">
+            <a:pPr marL="216000" indent="-214920">
               <a:lnSpc>
                 <a:spcPct val="100000"/>
               </a:lnSpc>
@@ -28288,7 +28324,7 @@
             </a:endParaRPr>
           </a:p>
           <a:p>
-            <a:pPr marL="216000" indent="-215280">
+            <a:pPr marL="216000" indent="-214920">
               <a:lnSpc>
                 <a:spcPct val="100000"/>
               </a:lnSpc>
@@ -28320,7 +28356,7 @@
             </a:endParaRPr>
           </a:p>
           <a:p>
-            <a:pPr marL="216000" indent="-215280">
+            <a:pPr marL="216000" indent="-214920">
               <a:lnSpc>
                 <a:spcPct val="100000"/>
               </a:lnSpc>
@@ -28352,7 +28388,7 @@
             </a:endParaRPr>
           </a:p>
           <a:p>
-            <a:pPr marL="216000" indent="-215280">
+            <a:pPr marL="216000" indent="-214920">
               <a:lnSpc>
                 <a:spcPct val="100000"/>
               </a:lnSpc>
@@ -28442,7 +28478,7 @@
         <p:spPr>
           <a:xfrm>
             <a:off x="601560" y="374760"/>
-            <a:ext cx="8075520" cy="762120"/>
+            <a:ext cx="8075160" cy="761760"/>
           </a:xfrm>
           <a:prstGeom prst="rect">
             <a:avLst/>
@@ -28493,7 +28529,7 @@
         <p:spPr>
           <a:xfrm>
             <a:off x="731520" y="1920240"/>
-            <a:ext cx="7771680" cy="3619800"/>
+            <a:ext cx="7771320" cy="3619440"/>
           </a:xfrm>
           <a:prstGeom prst="rect">
             <a:avLst/>
@@ -28512,7 +28548,7 @@
         <p:txBody>
           <a:bodyPr lIns="90000" rIns="90000" tIns="45000" bIns="45000"/>
           <a:p>
-            <a:pPr marL="216000" indent="-215280">
+            <a:pPr marL="216000" indent="-214920">
               <a:lnSpc>
                 <a:spcPct val="100000"/>
               </a:lnSpc>
@@ -28564,7 +28600,7 @@
             </a:endParaRPr>
           </a:p>
           <a:p>
-            <a:pPr marL="216000" indent="-215280">
+            <a:pPr marL="216000" indent="-214920">
               <a:lnSpc>
                 <a:spcPct val="100000"/>
               </a:lnSpc>
@@ -28606,7 +28642,7 @@
             </a:endParaRPr>
           </a:p>
           <a:p>
-            <a:pPr marL="216000" indent="-215280">
+            <a:pPr marL="216000" indent="-214920">
               <a:lnSpc>
                 <a:spcPct val="100000"/>
               </a:lnSpc>
@@ -28664,7 +28700,7 @@
             </a:endParaRPr>
           </a:p>
           <a:p>
-            <a:pPr marL="216000" indent="-215280">
+            <a:pPr marL="216000" indent="-214920">
               <a:lnSpc>
                 <a:spcPct val="100000"/>
               </a:lnSpc>
@@ -28755,7 +28791,7 @@
         <p:spPr>
           <a:xfrm>
             <a:off x="601560" y="374760"/>
-            <a:ext cx="8075520" cy="762120"/>
+            <a:ext cx="8075160" cy="761760"/>
           </a:xfrm>
           <a:prstGeom prst="rect">
             <a:avLst/>
@@ -28806,7 +28842,7 @@
         <p:spPr>
           <a:xfrm>
             <a:off x="731520" y="1920240"/>
-            <a:ext cx="7771320" cy="3619440"/>
+            <a:ext cx="7770960" cy="3619080"/>
           </a:xfrm>
           <a:prstGeom prst="rect">
             <a:avLst/>
@@ -29146,7 +29182,7 @@
         <p:spPr>
           <a:xfrm>
             <a:off x="601560" y="374760"/>
-            <a:ext cx="8092080" cy="762120"/>
+            <a:ext cx="8091720" cy="761760"/>
           </a:xfrm>
           <a:prstGeom prst="rect">
             <a:avLst/>
@@ -29197,7 +29233,7 @@
         <p:spPr>
           <a:xfrm>
             <a:off x="365760" y="2103120"/>
-            <a:ext cx="8411760" cy="2010960"/>
+            <a:ext cx="8411400" cy="2010600"/>
           </a:xfrm>
           <a:prstGeom prst="rect">
             <a:avLst/>
@@ -29218,7 +29254,7 @@
             <a:normAutofit/>
           </a:bodyPr>
           <a:p>
-            <a:pPr marL="432000" indent="-323280">
+            <a:pPr marL="432000" indent="-322920">
               <a:lnSpc>
                 <a:spcPct val="115000"/>
               </a:lnSpc>
@@ -29247,7 +29283,7 @@
             </a:endParaRPr>
           </a:p>
           <a:p>
-            <a:pPr marL="432000" indent="-323280">
+            <a:pPr marL="432000" indent="-322920">
               <a:lnSpc>
                 <a:spcPct val="115000"/>
               </a:lnSpc>
@@ -29276,7 +29312,7 @@
             </a:endParaRPr>
           </a:p>
           <a:p>
-            <a:pPr marL="432000" indent="-323280">
+            <a:pPr marL="432000" indent="-322920">
               <a:lnSpc>
                 <a:spcPct val="115000"/>
               </a:lnSpc>
@@ -29335,7 +29371,7 @@
         <p:spPr>
           <a:xfrm>
             <a:off x="984960" y="4589640"/>
-            <a:ext cx="7232400" cy="1112040"/>
+            <a:ext cx="7232040" cy="1111680"/>
           </a:xfrm>
           <a:prstGeom prst="rect">
             <a:avLst/>
@@ -29461,7 +29497,7 @@
         <p:spPr>
           <a:xfrm>
             <a:off x="601560" y="374760"/>
-            <a:ext cx="8092080" cy="762120"/>
+            <a:ext cx="8091720" cy="761760"/>
           </a:xfrm>
           <a:prstGeom prst="rect">
             <a:avLst/>
@@ -29536,7 +29572,7 @@
         <p:spPr>
           <a:xfrm>
             <a:off x="2028240" y="1645920"/>
-            <a:ext cx="6885720" cy="4847760"/>
+            <a:ext cx="6885360" cy="4847400"/>
           </a:xfrm>
           <a:prstGeom prst="rect">
             <a:avLst/>
@@ -29558,7 +29594,7 @@
         <p:spPr>
           <a:xfrm>
             <a:off x="2759760" y="4297680"/>
-            <a:ext cx="2010960" cy="365040"/>
+            <a:ext cx="2010600" cy="364680"/>
           </a:xfrm>
           <a:prstGeom prst="wedgeRoundRectCallout">
             <a:avLst>
@@ -29616,7 +29652,7 @@
         <p:spPr>
           <a:xfrm>
             <a:off x="145080" y="2276280"/>
-            <a:ext cx="1818360" cy="489240"/>
+            <a:ext cx="1818000" cy="488880"/>
           </a:xfrm>
           <a:prstGeom prst="rect">
             <a:avLst/>
@@ -29685,7 +29721,7 @@
         <p:spPr>
           <a:xfrm>
             <a:off x="289800" y="3653640"/>
-            <a:ext cx="1527120" cy="489240"/>
+            <a:ext cx="1526760" cy="488880"/>
           </a:xfrm>
           <a:prstGeom prst="rect">
             <a:avLst/>
@@ -29754,7 +29790,7 @@
         <p:spPr>
           <a:xfrm>
             <a:off x="40680" y="5113800"/>
-            <a:ext cx="1926360" cy="489240"/>
+            <a:ext cx="1926000" cy="488880"/>
           </a:xfrm>
           <a:prstGeom prst="rect">
             <a:avLst/>
@@ -29823,7 +29859,7 @@
         <p:spPr>
           <a:xfrm>
             <a:off x="8138160" y="5212080"/>
-            <a:ext cx="1005480" cy="914040"/>
+            <a:ext cx="1005120" cy="913680"/>
           </a:xfrm>
           <a:custGeom>
             <a:avLst/>
@@ -30051,7 +30087,7 @@
         <p:spPr>
           <a:xfrm>
             <a:off x="601560" y="374760"/>
-            <a:ext cx="8092080" cy="762120"/>
+            <a:ext cx="8091720" cy="761760"/>
           </a:xfrm>
           <a:prstGeom prst="rect">
             <a:avLst/>
@@ -30102,7 +30138,7 @@
         <p:spPr>
           <a:xfrm>
             <a:off x="457560" y="2269800"/>
-            <a:ext cx="8228520" cy="2423160"/>
+            <a:ext cx="8228160" cy="2422800"/>
           </a:xfrm>
           <a:prstGeom prst="rect">
             <a:avLst/>
@@ -30146,7 +30182,7 @@
             </a:endParaRPr>
           </a:p>
           <a:p>
-            <a:pPr lvl="7" marL="3456000" indent="-215280">
+            <a:pPr lvl="7" marL="3456000" indent="-214920">
               <a:lnSpc>
                 <a:spcPct val="150000"/>
               </a:lnSpc>
@@ -30175,7 +30211,7 @@
             </a:endParaRPr>
           </a:p>
           <a:p>
-            <a:pPr lvl="7" marL="3456000" indent="-215280">
+            <a:pPr lvl="7" marL="3456000" indent="-214920">
               <a:lnSpc>
                 <a:spcPct val="150000"/>
               </a:lnSpc>
@@ -30204,7 +30240,7 @@
             </a:endParaRPr>
           </a:p>
           <a:p>
-            <a:pPr lvl="7" marL="3456000" indent="-215280">
+            <a:pPr lvl="7" marL="3456000" indent="-214920">
               <a:lnSpc>
                 <a:spcPct val="150000"/>
               </a:lnSpc>
@@ -30233,7 +30269,7 @@
             </a:endParaRPr>
           </a:p>
           <a:p>
-            <a:pPr lvl="7" marL="3456000" indent="-215280">
+            <a:pPr lvl="7" marL="3456000" indent="-214920">
               <a:lnSpc>
                 <a:spcPct val="150000"/>
               </a:lnSpc>
@@ -30272,7 +30308,7 @@
         <p:spPr>
           <a:xfrm>
             <a:off x="2898000" y="3019320"/>
-            <a:ext cx="365040" cy="1645200"/>
+            <a:ext cx="364680" cy="1644840"/>
           </a:xfrm>
           <a:custGeom>
             <a:avLst/>
@@ -30337,7 +30373,7 @@
         <p:spPr>
           <a:xfrm>
             <a:off x="457560" y="3194640"/>
-            <a:ext cx="2193480" cy="1370880"/>
+            <a:ext cx="2193120" cy="1370520"/>
           </a:xfrm>
           <a:prstGeom prst="rect">
             <a:avLst/>
@@ -30465,7 +30501,7 @@
         <p:spPr>
           <a:xfrm>
             <a:off x="601560" y="374760"/>
-            <a:ext cx="8092080" cy="762120"/>
+            <a:ext cx="8091720" cy="761760"/>
           </a:xfrm>
           <a:prstGeom prst="rect">
             <a:avLst/>
@@ -30520,7 +30556,7 @@
         <p:spPr>
           <a:xfrm>
             <a:off x="91440" y="2011680"/>
-            <a:ext cx="8960400" cy="4754160"/>
+            <a:ext cx="8960040" cy="4753800"/>
           </a:xfrm>
           <a:prstGeom prst="rect">
             <a:avLst/>
@@ -30542,7 +30578,7 @@
         <p:spPr>
           <a:xfrm>
             <a:off x="4206240" y="1901880"/>
-            <a:ext cx="4845600" cy="4426920"/>
+            <a:ext cx="4845240" cy="4426560"/>
           </a:xfrm>
           <a:prstGeom prst="rect">
             <a:avLst/>
@@ -30771,7 +30807,7 @@
         <p:spPr>
           <a:xfrm>
             <a:off x="2128680" y="527760"/>
-            <a:ext cx="6516000" cy="762120"/>
+            <a:ext cx="6515640" cy="761760"/>
           </a:xfrm>
           <a:prstGeom prst="rect">
             <a:avLst/>
@@ -30820,7 +30856,7 @@
         <p:spPr>
           <a:xfrm>
             <a:off x="1645920" y="1596600"/>
-            <a:ext cx="6998760" cy="2974680"/>
+            <a:ext cx="6998400" cy="2974320"/>
           </a:xfrm>
           <a:prstGeom prst="rect">
             <a:avLst/>
@@ -30839,7 +30875,7 @@
         <p:txBody>
           <a:bodyPr lIns="90000" rIns="90000" tIns="45000" bIns="45000"/>
           <a:p>
-            <a:pPr marL="343080" indent="-341640">
+            <a:pPr marL="343080" indent="-341280">
               <a:lnSpc>
                 <a:spcPct val="100000"/>
               </a:lnSpc>
@@ -30880,7 +30916,7 @@
             </a:endParaRPr>
           </a:p>
           <a:p>
-            <a:pPr marL="343080" indent="-341640">
+            <a:pPr marL="343080" indent="-341280">
               <a:lnSpc>
                 <a:spcPct val="100000"/>
               </a:lnSpc>
@@ -30931,7 +30967,7 @@
         <p:spPr>
           <a:xfrm>
             <a:off x="1645920" y="4846320"/>
-            <a:ext cx="7040160" cy="1462320"/>
+            <a:ext cx="7039800" cy="1461960"/>
           </a:xfrm>
           <a:prstGeom prst="rect">
             <a:avLst/>
@@ -31029,7 +31065,7 @@
         <p:spPr>
           <a:xfrm>
             <a:off x="2128680" y="527760"/>
-            <a:ext cx="6516000" cy="762120"/>
+            <a:ext cx="6515640" cy="761760"/>
           </a:xfrm>
           <a:prstGeom prst="rect">
             <a:avLst/>
@@ -31078,7 +31114,7 @@
         <p:spPr>
           <a:xfrm>
             <a:off x="1371600" y="1860480"/>
-            <a:ext cx="3108240" cy="4520160"/>
+            <a:ext cx="3107880" cy="4519800"/>
           </a:xfrm>
           <a:prstGeom prst="rect">
             <a:avLst/>
@@ -31502,7 +31538,7 @@
         <p:spPr>
           <a:xfrm>
             <a:off x="4588560" y="1554480"/>
-            <a:ext cx="4343760" cy="5028480"/>
+            <a:ext cx="4343400" cy="5028120"/>
           </a:xfrm>
           <a:prstGeom prst="rect">
             <a:avLst/>

</xml_diff>

<commit_message>
Switch out MS Docs with PDFs
</commit_message>
<xml_diff>
--- a/capstone_projects/capstone_I/06_Capstone_I_Pitch_Prediction_Slidedeck.pptx
+++ b/capstone_projects/capstone_I/06_Capstone_I_Pitch_Prediction_Slidedeck.pptx
@@ -10764,7 +10764,13 @@
               <a:rPr b="0" lang="en-US" sz="4400" spc="-1" strike="noStrike">
                 <a:latin typeface="Arial"/>
               </a:rPr>
-              <a:t>Click to edit the title text format</a:t>
+              <a:t>Click to edit the title text </a:t>
+            </a:r>
+            <a:r>
+              <a:rPr b="0" lang="en-US" sz="4400" spc="-1" strike="noStrike">
+                <a:latin typeface="Arial"/>
+              </a:rPr>
+              <a:t>format</a:t>
             </a:r>
             <a:endParaRPr b="0" lang="en-US" sz="4400" spc="-1" strike="noStrike">
               <a:latin typeface="Arial"/>
@@ -11024,7 +11030,19 @@
               <a:rPr b="0" lang="en-US" sz="1800" spc="-1" strike="noStrike">
                 <a:latin typeface="Arial"/>
               </a:rPr>
-              <a:t>Click to edit the title text format</a:t>
+              <a:t>Click to edit </a:t>
+            </a:r>
+            <a:r>
+              <a:rPr b="0" lang="en-US" sz="1800" spc="-1" strike="noStrike">
+                <a:latin typeface="Arial"/>
+              </a:rPr>
+              <a:t>the title text </a:t>
+            </a:r>
+            <a:r>
+              <a:rPr b="0" lang="en-US" sz="1800" spc="-1" strike="noStrike">
+                <a:latin typeface="Arial"/>
+              </a:rPr>
+              <a:t>format</a:t>
             </a:r>
             <a:endParaRPr b="0" lang="en-US" sz="1800" spc="-1" strike="noStrike">
               <a:latin typeface="Arial"/>
@@ -13359,7 +13377,7 @@
         <p:spPr>
           <a:xfrm>
             <a:off x="2468880" y="3429000"/>
-            <a:ext cx="6555240" cy="1677960"/>
+            <a:ext cx="6554880" cy="1677600"/>
           </a:xfrm>
           <a:prstGeom prst="rect">
             <a:avLst/>
@@ -13419,7 +13437,7 @@
         <p:spPr>
           <a:xfrm>
             <a:off x="2468880" y="5108760"/>
-            <a:ext cx="6555240" cy="609120"/>
+            <a:ext cx="6554880" cy="608760"/>
           </a:xfrm>
           <a:prstGeom prst="rect">
             <a:avLst/>
@@ -13471,7 +13489,7 @@
         <p:spPr>
           <a:xfrm>
             <a:off x="2414880" y="5843520"/>
-            <a:ext cx="6545160" cy="830520"/>
+            <a:ext cx="6544800" cy="830160"/>
           </a:xfrm>
           <a:prstGeom prst="rect">
             <a:avLst/>
@@ -13572,7 +13590,7 @@
         <p:spPr>
           <a:xfrm>
             <a:off x="2128680" y="527760"/>
-            <a:ext cx="6515640" cy="761760"/>
+            <a:ext cx="6515280" cy="761400"/>
           </a:xfrm>
           <a:prstGeom prst="rect">
             <a:avLst/>
@@ -13621,7 +13639,7 @@
         <p:spPr>
           <a:xfrm>
             <a:off x="1371600" y="4937760"/>
-            <a:ext cx="7405560" cy="1442520"/>
+            <a:ext cx="7405200" cy="1442160"/>
           </a:xfrm>
           <a:prstGeom prst="rect">
             <a:avLst/>
@@ -13640,7 +13658,7 @@
         <p:txBody>
           <a:bodyPr lIns="90000" rIns="90000" tIns="45000" bIns="45000"/>
           <a:p>
-            <a:pPr marL="216000" indent="-214920">
+            <a:pPr marL="216000" indent="-214560">
               <a:lnSpc>
                 <a:spcPct val="100000"/>
               </a:lnSpc>
@@ -13676,7 +13694,7 @@
             </a:endParaRPr>
           </a:p>
           <a:p>
-            <a:pPr marL="216000" indent="-214920">
+            <a:pPr marL="216000" indent="-214560">
               <a:lnSpc>
                 <a:spcPct val="100000"/>
               </a:lnSpc>
@@ -13712,9 +13730,9 @@
         <p:grpSpPr>
           <a:xfrm>
             <a:off x="2926080" y="1527120"/>
-            <a:ext cx="4303080" cy="3236400"/>
+            <a:ext cx="4302720" cy="3236040"/>
             <a:chOff x="2926080" y="1527120"/>
-            <a:chExt cx="4303080" cy="3236400"/>
+            <a:chExt cx="4302720" cy="3236040"/>
           </a:xfrm>
         </p:grpSpPr>
         <p:pic>
@@ -13730,7 +13748,7 @@
           <p:spPr>
             <a:xfrm>
               <a:off x="2932560" y="1840320"/>
-              <a:ext cx="4296600" cy="2923200"/>
+              <a:ext cx="4296240" cy="2922840"/>
             </a:xfrm>
             <a:prstGeom prst="rect">
               <a:avLst/>
@@ -13752,7 +13770,7 @@
           <p:spPr>
             <a:xfrm>
               <a:off x="2926080" y="1527120"/>
-              <a:ext cx="4303080" cy="312120"/>
+              <a:ext cx="4302720" cy="311760"/>
             </a:xfrm>
             <a:prstGeom prst="rect">
               <a:avLst/>
@@ -13851,7 +13869,7 @@
         <p:spPr>
           <a:xfrm>
             <a:off x="2128680" y="527760"/>
-            <a:ext cx="6515640" cy="761760"/>
+            <a:ext cx="6515280" cy="761400"/>
           </a:xfrm>
           <a:prstGeom prst="rect">
             <a:avLst/>
@@ -13900,7 +13918,7 @@
         <p:spPr>
           <a:xfrm>
             <a:off x="1640160" y="1521360"/>
-            <a:ext cx="2559240" cy="2284920"/>
+            <a:ext cx="2558880" cy="2284560"/>
           </a:xfrm>
           <a:prstGeom prst="rect">
             <a:avLst/>
@@ -13938,9 +13956,6 @@
               <a:t>Past Events:</a:t>
             </a:r>
             <a:endParaRPr b="0" lang="en-US" sz="1800" spc="-1" strike="noStrike">
-              <a:solidFill>
-                <a:srgbClr val="ffffff"/>
-              </a:solidFill>
               <a:latin typeface="Arial"/>
             </a:endParaRPr>
           </a:p>
@@ -13961,9 +13976,6 @@
               <a:t>Pitch Type</a:t>
             </a:r>
             <a:endParaRPr b="0" lang="en-US" sz="1500" spc="-1" strike="noStrike">
-              <a:solidFill>
-                <a:srgbClr val="ffffff"/>
-              </a:solidFill>
               <a:latin typeface="Arial"/>
             </a:endParaRPr>
           </a:p>
@@ -13984,9 +13996,6 @@
               <a:t>Pitch Velocity</a:t>
             </a:r>
             <a:endParaRPr b="0" lang="en-US" sz="1500" spc="-1" strike="noStrike">
-              <a:solidFill>
-                <a:srgbClr val="ffffff"/>
-              </a:solidFill>
               <a:latin typeface="Arial"/>
             </a:endParaRPr>
           </a:p>
@@ -14017,9 +14026,6 @@
               <a:t>*</a:t>
             </a:r>
             <a:endParaRPr b="0" lang="en-US" sz="1500" spc="-1" strike="noStrike">
-              <a:solidFill>
-                <a:srgbClr val="ffffff"/>
-              </a:solidFill>
               <a:latin typeface="Arial"/>
             </a:endParaRPr>
           </a:p>
@@ -14050,9 +14056,6 @@
               <a:t>*</a:t>
             </a:r>
             <a:endParaRPr b="0" lang="en-US" sz="1500" spc="-1" strike="noStrike">
-              <a:solidFill>
-                <a:srgbClr val="ffffff"/>
-              </a:solidFill>
               <a:latin typeface="Arial"/>
             </a:endParaRPr>
           </a:p>
@@ -14083,9 +14086,6 @@
               <a:t>*</a:t>
             </a:r>
             <a:endParaRPr b="0" lang="en-US" sz="1500" spc="-1" strike="noStrike">
-              <a:solidFill>
-                <a:srgbClr val="ffffff"/>
-              </a:solidFill>
               <a:latin typeface="Arial"/>
             </a:endParaRPr>
           </a:p>
@@ -14116,9 +14116,6 @@
               <a:t>*</a:t>
             </a:r>
             <a:endParaRPr b="0" lang="en-US" sz="1500" spc="-1" strike="noStrike">
-              <a:solidFill>
-                <a:srgbClr val="ffffff"/>
-              </a:solidFill>
               <a:latin typeface="Arial"/>
             </a:endParaRPr>
           </a:p>
@@ -14149,9 +14146,6 @@
               <a:t>*</a:t>
             </a:r>
             <a:endParaRPr b="0" lang="en-US" sz="1500" spc="-1" strike="noStrike">
-              <a:solidFill>
-                <a:srgbClr val="ffffff"/>
-              </a:solidFill>
               <a:latin typeface="Arial"/>
             </a:endParaRPr>
           </a:p>
@@ -14182,9 +14176,6 @@
               <a:t>*</a:t>
             </a:r>
             <a:endParaRPr b="0" lang="en-US" sz="1500" spc="-1" strike="noStrike">
-              <a:solidFill>
-                <a:srgbClr val="ffffff"/>
-              </a:solidFill>
               <a:latin typeface="Arial"/>
             </a:endParaRPr>
           </a:p>
@@ -14215,9 +14206,6 @@
               <a:t>*</a:t>
             </a:r>
             <a:endParaRPr b="0" lang="en-US" sz="1500" spc="-1" strike="noStrike">
-              <a:solidFill>
-                <a:srgbClr val="ffffff"/>
-              </a:solidFill>
               <a:latin typeface="Arial"/>
             </a:endParaRPr>
           </a:p>
@@ -14228,9 +14216,6 @@
               </a:lnSpc>
             </a:pPr>
             <a:endParaRPr b="0" lang="en-US" sz="1500" spc="-1" strike="noStrike">
-              <a:solidFill>
-                <a:srgbClr val="ffffff"/>
-              </a:solidFill>
               <a:latin typeface="Arial"/>
             </a:endParaRPr>
           </a:p>
@@ -14241,9 +14226,6 @@
               </a:lnSpc>
             </a:pPr>
             <a:endParaRPr b="0" lang="en-US" sz="1500" spc="-1" strike="noStrike">
-              <a:solidFill>
-                <a:srgbClr val="ffffff"/>
-              </a:solidFill>
               <a:latin typeface="Arial"/>
             </a:endParaRPr>
           </a:p>
@@ -14258,7 +14240,7 @@
         <p:spPr>
           <a:xfrm>
             <a:off x="4098240" y="1626480"/>
-            <a:ext cx="4861800" cy="4861800"/>
+            <a:ext cx="4861440" cy="4861440"/>
           </a:xfrm>
           <a:prstGeom prst="rect">
             <a:avLst/>
@@ -14721,7 +14703,7 @@
         <p:spPr>
           <a:xfrm>
             <a:off x="1640160" y="3898080"/>
-            <a:ext cx="2559240" cy="2413080"/>
+            <a:ext cx="2558880" cy="2412720"/>
           </a:xfrm>
           <a:prstGeom prst="rect">
             <a:avLst/>
@@ -14759,9 +14741,6 @@
               <a:t>Current Situations:</a:t>
             </a:r>
             <a:endParaRPr b="0" lang="en-US" sz="1800" spc="-1" strike="noStrike">
-              <a:solidFill>
-                <a:srgbClr val="ffffff"/>
-              </a:solidFill>
               <a:latin typeface="Arial"/>
             </a:endParaRPr>
           </a:p>
@@ -14782,9 +14761,6 @@
               <a:t>Inning</a:t>
             </a:r>
             <a:endParaRPr b="0" lang="en-US" sz="1500" spc="-1" strike="noStrike">
-              <a:solidFill>
-                <a:srgbClr val="ffffff"/>
-              </a:solidFill>
               <a:latin typeface="Arial"/>
             </a:endParaRPr>
           </a:p>
@@ -14815,9 +14791,6 @@
               <a:t>*</a:t>
             </a:r>
             <a:endParaRPr b="0" lang="en-US" sz="1500" spc="-1" strike="noStrike">
-              <a:solidFill>
-                <a:srgbClr val="ffffff"/>
-              </a:solidFill>
               <a:latin typeface="Arial"/>
             </a:endParaRPr>
           </a:p>
@@ -14838,9 +14811,6 @@
               <a:t>Pitch Count</a:t>
             </a:r>
             <a:endParaRPr b="0" lang="en-US" sz="1500" spc="-1" strike="noStrike">
-              <a:solidFill>
-                <a:srgbClr val="ffffff"/>
-              </a:solidFill>
               <a:latin typeface="Arial"/>
             </a:endParaRPr>
           </a:p>
@@ -14861,9 +14831,6 @@
               <a:t>Hitter Count</a:t>
             </a:r>
             <a:endParaRPr b="0" lang="en-US" sz="1500" spc="-1" strike="noStrike">
-              <a:solidFill>
-                <a:srgbClr val="ffffff"/>
-              </a:solidFill>
               <a:latin typeface="Arial"/>
             </a:endParaRPr>
           </a:p>
@@ -14894,9 +14861,6 @@
               <a:t>*</a:t>
             </a:r>
             <a:endParaRPr b="0" lang="en-US" sz="1500" spc="-1" strike="noStrike">
-              <a:solidFill>
-                <a:srgbClr val="ffffff"/>
-              </a:solidFill>
               <a:latin typeface="Arial"/>
             </a:endParaRPr>
           </a:p>
@@ -14927,9 +14891,6 @@
               <a:t>*</a:t>
             </a:r>
             <a:endParaRPr b="0" lang="en-US" sz="1500" spc="-1" strike="noStrike">
-              <a:solidFill>
-                <a:srgbClr val="ffffff"/>
-              </a:solidFill>
               <a:latin typeface="Arial"/>
             </a:endParaRPr>
           </a:p>
@@ -14950,9 +14911,6 @@
               <a:t>Number of Outs</a:t>
             </a:r>
             <a:endParaRPr b="0" lang="en-US" sz="1500" spc="-1" strike="noStrike">
-              <a:solidFill>
-                <a:srgbClr val="ffffff"/>
-              </a:solidFill>
               <a:latin typeface="Arial"/>
             </a:endParaRPr>
           </a:p>
@@ -14973,9 +14931,6 @@
               <a:t>Cumulative Pitch Type Sums</a:t>
             </a:r>
             <a:endParaRPr b="0" lang="en-US" sz="1500" spc="-1" strike="noStrike">
-              <a:solidFill>
-                <a:srgbClr val="ffffff"/>
-              </a:solidFill>
               <a:latin typeface="Arial"/>
             </a:endParaRPr>
           </a:p>
@@ -14996,9 +14951,6 @@
               <a:t>Cumulative Pitch Type %</a:t>
             </a:r>
             <a:endParaRPr b="0" lang="en-US" sz="1500" spc="-1" strike="noStrike">
-              <a:solidFill>
-                <a:srgbClr val="ffffff"/>
-              </a:solidFill>
               <a:latin typeface="Arial"/>
             </a:endParaRPr>
           </a:p>
@@ -15013,7 +14965,7 @@
         <p:spPr>
           <a:xfrm>
             <a:off x="1573920" y="6348240"/>
-            <a:ext cx="2376360" cy="300960"/>
+            <a:ext cx="2376000" cy="300600"/>
           </a:xfrm>
           <a:prstGeom prst="rect">
             <a:avLst/>
@@ -15048,9 +15000,6 @@
               <a:t>* categorical features</a:t>
             </a:r>
             <a:endParaRPr b="0" lang="en-US" sz="1500" spc="-1" strike="noStrike">
-              <a:solidFill>
-                <a:srgbClr val="ffffff"/>
-              </a:solidFill>
               <a:latin typeface="Arial"/>
             </a:endParaRPr>
           </a:p>
@@ -15114,7 +15063,7 @@
         <p:spPr>
           <a:xfrm>
             <a:off x="601560" y="374760"/>
-            <a:ext cx="8091720" cy="761760"/>
+            <a:ext cx="8091360" cy="761400"/>
           </a:xfrm>
           <a:prstGeom prst="rect">
             <a:avLst/>
@@ -15169,7 +15118,7 @@
         <p:spPr>
           <a:xfrm>
             <a:off x="274320" y="3183840"/>
-            <a:ext cx="3354840" cy="1448640"/>
+            <a:ext cx="3354480" cy="1448280"/>
           </a:xfrm>
           <a:prstGeom prst="rect">
             <a:avLst/>
@@ -15195,7 +15144,7 @@
         <p:spPr>
           <a:xfrm>
             <a:off x="6145920" y="1335600"/>
-            <a:ext cx="2284920" cy="1827720"/>
+            <a:ext cx="2284560" cy="1827360"/>
           </a:xfrm>
           <a:prstGeom prst="rect">
             <a:avLst/>
@@ -15217,9 +15166,9 @@
         <p:grpSpPr>
           <a:xfrm>
             <a:off x="5689080" y="3225600"/>
-            <a:ext cx="3162960" cy="1827720"/>
+            <a:ext cx="3162600" cy="1827360"/>
             <a:chOff x="5689080" y="3225600"/>
-            <a:chExt cx="3162960" cy="1827720"/>
+            <a:chExt cx="3162600" cy="1827360"/>
           </a:xfrm>
         </p:grpSpPr>
         <p:pic>
@@ -15235,7 +15184,7 @@
           <p:spPr>
             <a:xfrm>
               <a:off x="7764840" y="3225600"/>
-              <a:ext cx="1087200" cy="1827720"/>
+              <a:ext cx="1086840" cy="1827360"/>
             </a:xfrm>
             <a:prstGeom prst="rect">
               <a:avLst/>
@@ -15254,9 +15203,9 @@
           <p:grpSpPr>
             <a:xfrm>
               <a:off x="5689080" y="3225600"/>
-              <a:ext cx="2074680" cy="1827720"/>
+              <a:ext cx="2074320" cy="1827360"/>
               <a:chOff x="5689080" y="3225600"/>
-              <a:chExt cx="2074680" cy="1827720"/>
+              <a:chExt cx="2074320" cy="1827360"/>
             </a:xfrm>
           </p:grpSpPr>
           <p:pic>
@@ -15272,7 +15221,7 @@
             <p:spPr>
               <a:xfrm>
                 <a:off x="5689080" y="3225600"/>
-                <a:ext cx="1041480" cy="1827720"/>
+                <a:ext cx="1041120" cy="1827360"/>
               </a:xfrm>
               <a:prstGeom prst="rect">
                 <a:avLst/>
@@ -15295,7 +15244,7 @@
             <p:spPr>
               <a:xfrm>
                 <a:off x="6731640" y="3225600"/>
-                <a:ext cx="1032120" cy="1827720"/>
+                <a:ext cx="1031760" cy="1827360"/>
               </a:xfrm>
               <a:prstGeom prst="rect">
                 <a:avLst/>
@@ -15316,9 +15265,9 @@
         <p:grpSpPr>
           <a:xfrm>
             <a:off x="274320" y="1299600"/>
-            <a:ext cx="2193480" cy="1827720"/>
+            <a:ext cx="2193120" cy="1827360"/>
             <a:chOff x="274320" y="1299600"/>
-            <a:chExt cx="2193480" cy="1827720"/>
+            <a:chExt cx="2193120" cy="1827360"/>
           </a:xfrm>
         </p:grpSpPr>
         <p:pic>
@@ -15334,7 +15283,7 @@
           <p:spPr>
             <a:xfrm>
               <a:off x="274320" y="1299600"/>
-              <a:ext cx="1023120" cy="1827720"/>
+              <a:ext cx="1022760" cy="1827360"/>
             </a:xfrm>
             <a:prstGeom prst="rect">
               <a:avLst/>
@@ -15360,7 +15309,7 @@
           <p:spPr>
             <a:xfrm>
               <a:off x="1380600" y="1299600"/>
-              <a:ext cx="1087200" cy="1827720"/>
+              <a:ext cx="1086840" cy="1827360"/>
             </a:xfrm>
             <a:prstGeom prst="rect">
               <a:avLst/>
@@ -15387,7 +15336,7 @@
         <p:spPr>
           <a:xfrm>
             <a:off x="274320" y="4846320"/>
-            <a:ext cx="1032120" cy="1827720"/>
+            <a:ext cx="1031760" cy="1827360"/>
           </a:xfrm>
           <a:prstGeom prst="rect">
             <a:avLst/>
@@ -15409,7 +15358,7 @@
         <p:spPr>
           <a:xfrm>
             <a:off x="2560320" y="1281600"/>
-            <a:ext cx="2467800" cy="1710360"/>
+            <a:ext cx="2467440" cy="1710000"/>
           </a:xfrm>
           <a:prstGeom prst="rect">
             <a:avLst/>
@@ -15684,7 +15633,7 @@
         <p:spPr>
           <a:xfrm>
             <a:off x="1371600" y="4847760"/>
-            <a:ext cx="2193480" cy="1826280"/>
+            <a:ext cx="2193120" cy="1825920"/>
           </a:xfrm>
           <a:prstGeom prst="rect">
             <a:avLst/>
@@ -15814,7 +15763,7 @@
         <p:spPr>
           <a:xfrm>
             <a:off x="3749040" y="3474720"/>
-            <a:ext cx="1553400" cy="1161720"/>
+            <a:ext cx="1553040" cy="1161360"/>
           </a:xfrm>
           <a:prstGeom prst="rect">
             <a:avLst/>
@@ -15941,7 +15890,7 @@
         <p:spPr>
           <a:xfrm>
             <a:off x="3783600" y="4847760"/>
-            <a:ext cx="5176440" cy="1826280"/>
+            <a:ext cx="5176080" cy="1825920"/>
           </a:xfrm>
           <a:prstGeom prst="rect">
             <a:avLst/>
@@ -16235,7 +16184,7 @@
         <p:spPr>
           <a:xfrm>
             <a:off x="2056680" y="424080"/>
-            <a:ext cx="6363000" cy="761760"/>
+            <a:ext cx="6362640" cy="761400"/>
           </a:xfrm>
           <a:prstGeom prst="rect">
             <a:avLst/>
@@ -16284,7 +16233,7 @@
         <p:spPr>
           <a:xfrm>
             <a:off x="1463040" y="5603040"/>
-            <a:ext cx="7314120" cy="289080"/>
+            <a:ext cx="7313760" cy="288720"/>
           </a:xfrm>
           <a:prstGeom prst="rect">
             <a:avLst/>
@@ -16333,9 +16282,9 @@
         <p:grpSpPr>
           <a:xfrm>
             <a:off x="3158640" y="1360800"/>
-            <a:ext cx="3659400" cy="4194360"/>
+            <a:ext cx="3659040" cy="4194000"/>
             <a:chOff x="3158640" y="1360800"/>
-            <a:chExt cx="3659400" cy="4194360"/>
+            <a:chExt cx="3659040" cy="4194000"/>
           </a:xfrm>
         </p:grpSpPr>
         <p:pic>
@@ -16351,7 +16300,7 @@
           <p:spPr>
             <a:xfrm>
               <a:off x="3158640" y="1360800"/>
-              <a:ext cx="1231560" cy="4194360"/>
+              <a:ext cx="1231200" cy="4194000"/>
             </a:xfrm>
             <a:prstGeom prst="rect">
               <a:avLst/>
@@ -16374,7 +16323,7 @@
           <p:spPr>
             <a:xfrm>
               <a:off x="4373280" y="1360800"/>
-              <a:ext cx="2444760" cy="4194360"/>
+              <a:ext cx="2444400" cy="4194000"/>
             </a:xfrm>
             <a:prstGeom prst="rect">
               <a:avLst/>
@@ -16394,7 +16343,7 @@
         <p:spPr>
           <a:xfrm>
             <a:off x="3178080" y="5963040"/>
-            <a:ext cx="3587400" cy="545040"/>
+            <a:ext cx="3587040" cy="544680"/>
           </a:xfrm>
           <a:prstGeom prst="rect">
             <a:avLst/>
@@ -16492,7 +16441,7 @@
         <p:spPr>
           <a:xfrm>
             <a:off x="2056680" y="424080"/>
-            <a:ext cx="6363000" cy="761760"/>
+            <a:ext cx="6362640" cy="761400"/>
           </a:xfrm>
           <a:prstGeom prst="rect">
             <a:avLst/>
@@ -16541,7 +16490,7 @@
         <p:spPr>
           <a:xfrm>
             <a:off x="5494320" y="2106000"/>
-            <a:ext cx="3385080" cy="1001880"/>
+            <a:ext cx="3384720" cy="1001520"/>
           </a:xfrm>
           <a:prstGeom prst="rect">
             <a:avLst/>
@@ -16615,7 +16564,7 @@
         <p:spPr>
           <a:xfrm>
             <a:off x="1532160" y="2107800"/>
-            <a:ext cx="3549600" cy="1182960"/>
+            <a:ext cx="3549240" cy="1182600"/>
           </a:xfrm>
           <a:prstGeom prst="rect">
             <a:avLst/>
@@ -16689,7 +16638,7 @@
         <p:spPr>
           <a:xfrm>
             <a:off x="2194560" y="1304640"/>
-            <a:ext cx="6308280" cy="705960"/>
+            <a:ext cx="6307920" cy="705600"/>
           </a:xfrm>
           <a:prstGeom prst="rect">
             <a:avLst/>
@@ -16744,7 +16693,7 @@
         <p:spPr>
           <a:xfrm>
             <a:off x="1297800" y="3059280"/>
-            <a:ext cx="3766320" cy="3107880"/>
+            <a:ext cx="3765960" cy="3107520"/>
           </a:xfrm>
           <a:prstGeom prst="rect">
             <a:avLst/>
@@ -16766,7 +16715,7 @@
         <p:spPr>
           <a:xfrm>
             <a:off x="1463040" y="6215040"/>
-            <a:ext cx="7314120" cy="289080"/>
+            <a:ext cx="7313760" cy="288720"/>
           </a:xfrm>
           <a:prstGeom prst="rect">
             <a:avLst/>
@@ -16879,7 +16828,7 @@
         <p:spPr>
           <a:xfrm>
             <a:off x="5276160" y="3059280"/>
-            <a:ext cx="3501000" cy="3107880"/>
+            <a:ext cx="3500640" cy="3107520"/>
           </a:xfrm>
           <a:prstGeom prst="rect">
             <a:avLst/>
@@ -16950,7 +16899,7 @@
         <p:spPr>
           <a:xfrm>
             <a:off x="2056680" y="424080"/>
-            <a:ext cx="6363000" cy="761760"/>
+            <a:ext cx="6362640" cy="761400"/>
           </a:xfrm>
           <a:prstGeom prst="rect">
             <a:avLst/>
@@ -17029,7 +16978,7 @@
         <p:spPr>
           <a:xfrm>
             <a:off x="1618560" y="1556640"/>
-            <a:ext cx="7302600" cy="587160"/>
+            <a:ext cx="7302240" cy="586800"/>
           </a:xfrm>
           <a:prstGeom prst="rect">
             <a:avLst/>
@@ -17766,7 +17715,7 @@
         <p:spPr>
           <a:xfrm>
             <a:off x="1463040" y="4430880"/>
-            <a:ext cx="7405560" cy="1713600"/>
+            <a:ext cx="7405200" cy="1713240"/>
           </a:xfrm>
           <a:prstGeom prst="rect">
             <a:avLst/>
@@ -17961,7 +17910,7 @@
         <p:spPr>
           <a:xfrm>
             <a:off x="2572560" y="4009680"/>
-            <a:ext cx="4977000" cy="289440"/>
+            <a:ext cx="4976640" cy="289080"/>
           </a:xfrm>
           <a:prstGeom prst="rect">
             <a:avLst/>
@@ -18030,7 +17979,7 @@
         <p:spPr>
           <a:xfrm>
             <a:off x="3524400" y="6145920"/>
-            <a:ext cx="3016440" cy="401760"/>
+            <a:ext cx="3016080" cy="401400"/>
           </a:xfrm>
           <a:prstGeom prst="rect">
             <a:avLst/>
@@ -18128,7 +18077,7 @@
         <p:spPr>
           <a:xfrm>
             <a:off x="2056680" y="424080"/>
-            <a:ext cx="6363000" cy="761760"/>
+            <a:ext cx="6362640" cy="761400"/>
           </a:xfrm>
           <a:prstGeom prst="rect">
             <a:avLst/>
@@ -18207,7 +18156,7 @@
         <p:spPr>
           <a:xfrm>
             <a:off x="1371600" y="1920240"/>
-            <a:ext cx="7588440" cy="1644840"/>
+            <a:ext cx="7588080" cy="1644480"/>
           </a:xfrm>
           <a:prstGeom prst="rect">
             <a:avLst/>
@@ -18522,7 +18471,7 @@
         <p:spPr>
           <a:xfrm>
             <a:off x="1679040" y="4311000"/>
-            <a:ext cx="4662360" cy="2216160"/>
+            <a:ext cx="4662000" cy="2215800"/>
           </a:xfrm>
           <a:prstGeom prst="rect">
             <a:avLst/>
@@ -18544,7 +18493,7 @@
         <p:spPr>
           <a:xfrm>
             <a:off x="6564240" y="4372560"/>
-            <a:ext cx="2010600" cy="2010600"/>
+            <a:ext cx="2010240" cy="2010240"/>
           </a:xfrm>
           <a:custGeom>
             <a:avLst/>
@@ -18726,6 +18675,16 @@
                 <a:spcPct val="100000"/>
               </a:lnSpc>
             </a:pPr>
+            <a:r>
+              <a:rPr b="0" lang="en-US" sz="1800" spc="-1" strike="noStrike">
+                <a:solidFill>
+                  <a:srgbClr val="000000"/>
+                </a:solidFill>
+                <a:latin typeface="Arial"/>
+                <a:ea typeface="DejaVu Sans"/>
+              </a:rPr>
+              <a:t>Computed </a:t>
+            </a:r>
             <a:endParaRPr b="0" lang="en-US" sz="1800" spc="-1" strike="noStrike">
               <a:latin typeface="Arial"/>
             </a:endParaRPr>
@@ -18737,45 +18696,15 @@
               </a:lnSpc>
             </a:pPr>
             <a:r>
-              <a:rPr b="1" lang="en-US" sz="1800" spc="-1" strike="noStrike">
+              <a:rPr b="0" lang="en-US" sz="1800" spc="-1" strike="noStrike">
                 <a:solidFill>
                   <a:srgbClr val="000000"/>
                 </a:solidFill>
                 <a:latin typeface="Arial"/>
                 <a:ea typeface="DejaVu Sans"/>
               </a:rPr>
-              <a:t>Computed </a:t>
-            </a:r>
-            <a:endParaRPr b="0" lang="en-US" sz="1800" spc="-1" strike="noStrike">
-              <a:latin typeface="Arial"/>
-            </a:endParaRPr>
-          </a:p>
-          <a:p>
-            <a:pPr algn="ctr">
-              <a:lnSpc>
-                <a:spcPct val="100000"/>
-              </a:lnSpc>
-            </a:pPr>
-            <a:r>
-              <a:rPr b="1" lang="en-US" sz="1800" spc="-1" strike="noStrike">
-                <a:solidFill>
-                  <a:srgbClr val="000000"/>
-                </a:solidFill>
-                <a:latin typeface="Arial"/>
-                <a:ea typeface="DejaVu Sans"/>
-              </a:rPr>
               <a:t>Log Loss</a:t>
             </a:r>
-            <a:endParaRPr b="0" lang="en-US" sz="1800" spc="-1" strike="noStrike">
-              <a:latin typeface="Arial"/>
-            </a:endParaRPr>
-          </a:p>
-          <a:p>
-            <a:pPr algn="ctr">
-              <a:lnSpc>
-                <a:spcPct val="100000"/>
-              </a:lnSpc>
-            </a:pPr>
             <a:endParaRPr b="0" lang="en-US" sz="1800" spc="-1" strike="noStrike">
               <a:latin typeface="Arial"/>
             </a:endParaRPr>
@@ -18811,7 +18740,7 @@
         <p:spPr>
           <a:xfrm>
             <a:off x="1607040" y="3700080"/>
-            <a:ext cx="6948360" cy="541080"/>
+            <a:ext cx="6948000" cy="540720"/>
           </a:xfrm>
           <a:prstGeom prst="rect">
             <a:avLst/>
@@ -18929,7 +18858,7 @@
         <p:spPr>
           <a:xfrm>
             <a:off x="601560" y="374760"/>
-            <a:ext cx="8091720" cy="761760"/>
+            <a:ext cx="8091360" cy="761400"/>
           </a:xfrm>
           <a:prstGeom prst="rect">
             <a:avLst/>
@@ -18980,7 +18909,7 @@
         <p:spPr>
           <a:xfrm>
             <a:off x="1113840" y="1609920"/>
-            <a:ext cx="7039800" cy="601200"/>
+            <a:ext cx="7039440" cy="600840"/>
           </a:xfrm>
           <a:prstGeom prst="rect">
             <a:avLst/>
@@ -18999,7 +18928,7 @@
         <p:txBody>
           <a:bodyPr lIns="90000" rIns="90000" tIns="45000" bIns="45000"/>
           <a:p>
-            <a:pPr marL="216000" indent="-214920">
+            <a:pPr marL="216000" indent="-214560">
               <a:lnSpc>
                 <a:spcPct val="100000"/>
               </a:lnSpc>
@@ -19045,7 +18974,7 @@
             </a:endParaRPr>
           </a:p>
           <a:p>
-            <a:pPr marL="216000" indent="-214920">
+            <a:pPr marL="216000" indent="-214560">
               <a:lnSpc>
                 <a:spcPct val="100000"/>
               </a:lnSpc>
@@ -19105,7 +19034,7 @@
         <p:spPr>
           <a:xfrm>
             <a:off x="1740240" y="2305440"/>
-            <a:ext cx="5759640" cy="4244040"/>
+            <a:ext cx="5759280" cy="4243680"/>
           </a:xfrm>
           <a:prstGeom prst="rect">
             <a:avLst/>
@@ -19176,7 +19105,7 @@
         <p:spPr>
           <a:xfrm>
             <a:off x="601560" y="374760"/>
-            <a:ext cx="8091720" cy="761760"/>
+            <a:ext cx="8091360" cy="761400"/>
           </a:xfrm>
           <a:prstGeom prst="rect">
             <a:avLst/>
@@ -19227,7 +19156,7 @@
         <p:spPr>
           <a:xfrm>
             <a:off x="3011760" y="1686600"/>
-            <a:ext cx="5870520" cy="692640"/>
+            <a:ext cx="5870160" cy="692280"/>
           </a:xfrm>
           <a:prstGeom prst="rect">
             <a:avLst/>
@@ -19300,7 +19229,7 @@
         <p:spPr>
           <a:xfrm>
             <a:off x="3103560" y="2576880"/>
-            <a:ext cx="5634720" cy="3440520"/>
+            <a:ext cx="5634360" cy="3440160"/>
           </a:xfrm>
           <a:prstGeom prst="rect">
             <a:avLst/>
@@ -19322,7 +19251,7 @@
         <p:spPr>
           <a:xfrm>
             <a:off x="182880" y="2723760"/>
-            <a:ext cx="2775600" cy="3199320"/>
+            <a:ext cx="2775240" cy="3198960"/>
           </a:xfrm>
           <a:prstGeom prst="rect">
             <a:avLst/>
@@ -19372,7 +19301,7 @@
             </a:endParaRPr>
           </a:p>
           <a:p>
-            <a:pPr marL="216000" indent="-214920">
+            <a:pPr marL="216000" indent="-214560">
               <a:lnSpc>
                 <a:spcPct val="100000"/>
               </a:lnSpc>
@@ -19472,7 +19401,7 @@
             </a:endParaRPr>
           </a:p>
           <a:p>
-            <a:pPr marL="216000" indent="-214920">
+            <a:pPr marL="216000" indent="-214560">
               <a:lnSpc>
                 <a:spcPct val="100000"/>
               </a:lnSpc>
@@ -19501,7 +19430,7 @@
             </a:endParaRPr>
           </a:p>
           <a:p>
-            <a:pPr marL="216000" indent="-214920">
+            <a:pPr marL="216000" indent="-214560">
               <a:lnSpc>
                 <a:spcPct val="100000"/>
               </a:lnSpc>
@@ -19530,7 +19459,7 @@
             </a:endParaRPr>
           </a:p>
           <a:p>
-            <a:pPr marL="216000" indent="-214920">
+            <a:pPr marL="216000" indent="-214560">
               <a:lnSpc>
                 <a:spcPct val="100000"/>
               </a:lnSpc>
@@ -19559,7 +19488,7 @@
             </a:endParaRPr>
           </a:p>
           <a:p>
-            <a:pPr marL="216000" indent="-214920">
+            <a:pPr marL="216000" indent="-214560">
               <a:lnSpc>
                 <a:spcPct val="100000"/>
               </a:lnSpc>
@@ -19598,7 +19527,7 @@
         <p:spPr>
           <a:xfrm>
             <a:off x="4003920" y="6146640"/>
-            <a:ext cx="3930840" cy="289080"/>
+            <a:ext cx="3930480" cy="288720"/>
           </a:xfrm>
           <a:prstGeom prst="rect">
             <a:avLst/>
@@ -19696,7 +19625,7 @@
         <p:spPr>
           <a:xfrm>
             <a:off x="601560" y="374760"/>
-            <a:ext cx="8091720" cy="761760"/>
+            <a:ext cx="8091360" cy="761400"/>
           </a:xfrm>
           <a:prstGeom prst="rect">
             <a:avLst/>
@@ -19747,7 +19676,7 @@
         <p:spPr>
           <a:xfrm>
             <a:off x="2723760" y="1407600"/>
-            <a:ext cx="6216840" cy="364680"/>
+            <a:ext cx="6216480" cy="364320"/>
           </a:xfrm>
           <a:prstGeom prst="rect">
             <a:avLst/>
@@ -19819,7 +19748,7 @@
         <p:spPr>
           <a:xfrm>
             <a:off x="3350160" y="5894640"/>
-            <a:ext cx="4936680" cy="344520"/>
+            <a:ext cx="4936320" cy="344160"/>
           </a:xfrm>
           <a:prstGeom prst="rect">
             <a:avLst/>
@@ -19872,7 +19801,7 @@
         <p:spPr>
           <a:xfrm>
             <a:off x="3113640" y="2011680"/>
-            <a:ext cx="5463000" cy="3747960"/>
+            <a:ext cx="5462640" cy="3747600"/>
           </a:xfrm>
           <a:prstGeom prst="rect">
             <a:avLst/>
@@ -19894,7 +19823,7 @@
         <p:spPr>
           <a:xfrm>
             <a:off x="91440" y="2831760"/>
-            <a:ext cx="2925000" cy="1913400"/>
+            <a:ext cx="2924640" cy="1913040"/>
           </a:xfrm>
           <a:prstGeom prst="rect">
             <a:avLst/>
@@ -19964,7 +19893,7 @@
             </a:endParaRPr>
           </a:p>
           <a:p>
-            <a:pPr marL="216000" indent="-214920">
+            <a:pPr marL="216000" indent="-214560">
               <a:lnSpc>
                 <a:spcPct val="100000"/>
               </a:lnSpc>
@@ -20003,7 +19932,7 @@
             </a:endParaRPr>
           </a:p>
           <a:p>
-            <a:pPr marL="216000" indent="-214920">
+            <a:pPr marL="216000" indent="-214560">
               <a:lnSpc>
                 <a:spcPct val="100000"/>
               </a:lnSpc>
@@ -20101,7 +20030,7 @@
         <p:spPr>
           <a:xfrm>
             <a:off x="601560" y="374760"/>
-            <a:ext cx="8091720" cy="761760"/>
+            <a:ext cx="8091360" cy="761400"/>
           </a:xfrm>
           <a:prstGeom prst="rect">
             <a:avLst/>
@@ -20152,7 +20081,7 @@
         <p:spPr>
           <a:xfrm>
             <a:off x="365760" y="1954080"/>
-            <a:ext cx="8411400" cy="4171320"/>
+            <a:ext cx="8411040" cy="4170960"/>
           </a:xfrm>
           <a:prstGeom prst="rect">
             <a:avLst/>
@@ -20173,7 +20102,7 @@
             <a:normAutofit/>
           </a:bodyPr>
           <a:p>
-            <a:pPr marL="432000" indent="-322920">
+            <a:pPr marL="432000" indent="-322560">
               <a:lnSpc>
                 <a:spcPct val="100000"/>
               </a:lnSpc>
@@ -20291,7 +20220,7 @@
             </a:endParaRPr>
           </a:p>
           <a:p>
-            <a:pPr marL="432000" indent="-322920">
+            <a:pPr marL="432000" indent="-322560">
               <a:lnSpc>
                 <a:spcPct val="100000"/>
               </a:lnSpc>
@@ -20380,7 +20309,7 @@
             </a:endParaRPr>
           </a:p>
           <a:p>
-            <a:pPr marL="432000" indent="-322920">
+            <a:pPr marL="432000" indent="-322560">
               <a:lnSpc>
                 <a:spcPct val="100000"/>
               </a:lnSpc>
@@ -20533,7 +20462,7 @@
         <p:spPr>
           <a:xfrm>
             <a:off x="601560" y="374760"/>
-            <a:ext cx="8091720" cy="761760"/>
+            <a:ext cx="8091360" cy="761400"/>
           </a:xfrm>
           <a:prstGeom prst="rect">
             <a:avLst/>
@@ -20584,7 +20513,7 @@
         <p:spPr>
           <a:xfrm>
             <a:off x="2286000" y="1463040"/>
-            <a:ext cx="6546600" cy="1004760"/>
+            <a:ext cx="6546240" cy="1004400"/>
           </a:xfrm>
           <a:prstGeom prst="rect">
             <a:avLst/>
@@ -20633,7 +20562,7 @@
         <p:spPr>
           <a:xfrm>
             <a:off x="2286000" y="2579040"/>
-            <a:ext cx="2467800" cy="1296000"/>
+            <a:ext cx="2467440" cy="1295640"/>
           </a:xfrm>
           <a:prstGeom prst="rect">
             <a:avLst/>
@@ -20652,7 +20581,7 @@
         <p:txBody>
           <a:bodyPr lIns="90000" rIns="90000" tIns="45000" bIns="45000"/>
           <a:p>
-            <a:pPr marL="216000" indent="-214920">
+            <a:pPr marL="216000" indent="-214560">
               <a:lnSpc>
                 <a:spcPct val="100000"/>
               </a:lnSpc>
@@ -20681,7 +20610,7 @@
             </a:endParaRPr>
           </a:p>
           <a:p>
-            <a:pPr marL="216000" indent="-214920">
+            <a:pPr marL="216000" indent="-214560">
               <a:lnSpc>
                 <a:spcPct val="100000"/>
               </a:lnSpc>
@@ -20710,7 +20639,7 @@
             </a:endParaRPr>
           </a:p>
           <a:p>
-            <a:pPr marL="216000" indent="-214920">
+            <a:pPr marL="216000" indent="-214560">
               <a:lnSpc>
                 <a:spcPct val="100000"/>
               </a:lnSpc>
@@ -20749,7 +20678,7 @@
         <p:spPr>
           <a:xfrm>
             <a:off x="4826880" y="2579040"/>
-            <a:ext cx="303480" cy="1077480"/>
+            <a:ext cx="303120" cy="1077120"/>
           </a:xfrm>
           <a:custGeom>
             <a:avLst/>
@@ -20814,7 +20743,7 @@
         <p:spPr>
           <a:xfrm>
             <a:off x="5058000" y="2687400"/>
-            <a:ext cx="3422520" cy="692640"/>
+            <a:ext cx="3422160" cy="692280"/>
           </a:xfrm>
           <a:prstGeom prst="rect">
             <a:avLst/>
@@ -20889,7 +20818,7 @@
         <p:spPr>
           <a:xfrm>
             <a:off x="731520" y="4019040"/>
-            <a:ext cx="7771320" cy="2506320"/>
+            <a:ext cx="7770960" cy="2505960"/>
           </a:xfrm>
           <a:prstGeom prst="rect">
             <a:avLst/>
@@ -21119,7 +21048,7 @@
         <p:spPr>
           <a:xfrm>
             <a:off x="601560" y="374760"/>
-            <a:ext cx="8091720" cy="761760"/>
+            <a:ext cx="8091360" cy="761400"/>
           </a:xfrm>
           <a:prstGeom prst="rect">
             <a:avLst/>
@@ -21190,7 +21119,7 @@
         <p:spPr>
           <a:xfrm>
             <a:off x="365760" y="2293920"/>
-            <a:ext cx="8411400" cy="3831480"/>
+            <a:ext cx="8411040" cy="3831120"/>
           </a:xfrm>
           <a:prstGeom prst="rect">
             <a:avLst/>
@@ -21398,7 +21327,7 @@
         <p:spPr>
           <a:xfrm>
             <a:off x="601560" y="374760"/>
-            <a:ext cx="8091720" cy="761760"/>
+            <a:ext cx="8091360" cy="761400"/>
           </a:xfrm>
           <a:prstGeom prst="rect">
             <a:avLst/>
@@ -21449,7 +21378,7 @@
         <p:spPr>
           <a:xfrm>
             <a:off x="551520" y="1887120"/>
-            <a:ext cx="8170200" cy="939240"/>
+            <a:ext cx="8169840" cy="938880"/>
           </a:xfrm>
           <a:prstGeom prst="rect">
             <a:avLst/>
@@ -21529,7 +21458,7 @@
         <p:spPr>
           <a:xfrm>
             <a:off x="551520" y="2859120"/>
-            <a:ext cx="8170200" cy="2948400"/>
+            <a:ext cx="8169840" cy="2948040"/>
           </a:xfrm>
           <a:prstGeom prst="rect">
             <a:avLst/>
@@ -21548,7 +21477,7 @@
         <p:txBody>
           <a:bodyPr lIns="90000" rIns="90000" tIns="45000" bIns="45000"/>
           <a:p>
-            <a:pPr marL="216000" indent="-214920">
+            <a:pPr marL="216000" indent="-214560">
               <a:lnSpc>
                 <a:spcPct val="100000"/>
               </a:lnSpc>
@@ -21577,7 +21506,7 @@
             </a:endParaRPr>
           </a:p>
           <a:p>
-            <a:pPr marL="216000" indent="-214920">
+            <a:pPr marL="216000" indent="-214560">
               <a:lnSpc>
                 <a:spcPct val="100000"/>
               </a:lnSpc>
@@ -21606,7 +21535,7 @@
             </a:endParaRPr>
           </a:p>
           <a:p>
-            <a:pPr lvl="1" marL="457200" indent="-215640">
+            <a:pPr lvl="1" marL="457200" indent="-215280">
               <a:lnSpc>
                 <a:spcPct val="100000"/>
               </a:lnSpc>
@@ -21634,7 +21563,7 @@
             </a:endParaRPr>
           </a:p>
           <a:p>
-            <a:pPr lvl="1" marL="457200" indent="-215640">
+            <a:pPr lvl="1" marL="457200" indent="-215280">
               <a:lnSpc>
                 <a:spcPct val="100000"/>
               </a:lnSpc>
@@ -21662,7 +21591,7 @@
             </a:endParaRPr>
           </a:p>
           <a:p>
-            <a:pPr lvl="1" marL="457200" indent="-215640">
+            <a:pPr lvl="1" marL="457200" indent="-215280">
               <a:lnSpc>
                 <a:spcPct val="100000"/>
               </a:lnSpc>
@@ -21690,7 +21619,7 @@
             </a:endParaRPr>
           </a:p>
           <a:p>
-            <a:pPr lvl="1" marL="457200" indent="-215640">
+            <a:pPr lvl="1" marL="457200" indent="-215280">
               <a:lnSpc>
                 <a:spcPct val="100000"/>
               </a:lnSpc>
@@ -21718,7 +21647,7 @@
             </a:endParaRPr>
           </a:p>
           <a:p>
-            <a:pPr lvl="1" marL="457200" indent="-215640">
+            <a:pPr lvl="1" marL="457200" indent="-215280">
               <a:lnSpc>
                 <a:spcPct val="100000"/>
               </a:lnSpc>
@@ -21746,7 +21675,7 @@
             </a:endParaRPr>
           </a:p>
           <a:p>
-            <a:pPr marL="216000" indent="-214920">
+            <a:pPr marL="216000" indent="-214560">
               <a:lnSpc>
                 <a:spcPct val="100000"/>
               </a:lnSpc>
@@ -21775,7 +21704,7 @@
             </a:endParaRPr>
           </a:p>
           <a:p>
-            <a:pPr marL="216000" indent="-214920">
+            <a:pPr marL="216000" indent="-214560">
               <a:lnSpc>
                 <a:spcPct val="100000"/>
               </a:lnSpc>
@@ -21804,7 +21733,7 @@
             </a:endParaRPr>
           </a:p>
           <a:p>
-            <a:pPr marL="216000" indent="-214920">
+            <a:pPr marL="216000" indent="-214560">
               <a:lnSpc>
                 <a:spcPct val="100000"/>
               </a:lnSpc>
@@ -21912,7 +21841,7 @@
         <p:spPr>
           <a:xfrm>
             <a:off x="601560" y="374760"/>
-            <a:ext cx="8091720" cy="761760"/>
+            <a:ext cx="8091360" cy="761400"/>
           </a:xfrm>
           <a:prstGeom prst="rect">
             <a:avLst/>
@@ -21963,7 +21892,7 @@
         <p:spPr>
           <a:xfrm>
             <a:off x="127440" y="3078000"/>
-            <a:ext cx="2742120" cy="1762200"/>
+            <a:ext cx="2741760" cy="1761840"/>
           </a:xfrm>
           <a:prstGeom prst="rect">
             <a:avLst/>
@@ -22006,7 +21935,7 @@
             </a:endParaRPr>
           </a:p>
           <a:p>
-            <a:pPr marL="216000" indent="-214920">
+            <a:pPr marL="216000" indent="-214560">
               <a:lnSpc>
                 <a:spcPct val="100000"/>
               </a:lnSpc>
@@ -22035,7 +21964,7 @@
             </a:endParaRPr>
           </a:p>
           <a:p>
-            <a:pPr marL="216000" indent="-214920">
+            <a:pPr marL="216000" indent="-214560">
               <a:lnSpc>
                 <a:spcPct val="100000"/>
               </a:lnSpc>
@@ -22064,7 +21993,7 @@
             </a:endParaRPr>
           </a:p>
           <a:p>
-            <a:pPr marL="216000" indent="-214920">
+            <a:pPr marL="216000" indent="-214560">
               <a:lnSpc>
                 <a:spcPct val="100000"/>
               </a:lnSpc>
@@ -22107,7 +22036,7 @@
         <p:spPr>
           <a:xfrm>
             <a:off x="2926080" y="2362680"/>
-            <a:ext cx="5992560" cy="3902760"/>
+            <a:ext cx="5992200" cy="3902400"/>
           </a:xfrm>
           <a:prstGeom prst="rect">
             <a:avLst/>
@@ -22129,7 +22058,7 @@
         <p:spPr>
           <a:xfrm>
             <a:off x="2867760" y="6290640"/>
-            <a:ext cx="6125400" cy="322200"/>
+            <a:ext cx="6125040" cy="321840"/>
           </a:xfrm>
           <a:prstGeom prst="rect">
             <a:avLst/>
@@ -22178,7 +22107,7 @@
         <p:spPr>
           <a:xfrm>
             <a:off x="2795760" y="1753920"/>
-            <a:ext cx="6216840" cy="527400"/>
+            <a:ext cx="6216480" cy="527040"/>
           </a:xfrm>
           <a:prstGeom prst="rect">
             <a:avLst/>
@@ -22276,7 +22205,7 @@
         <p:spPr>
           <a:xfrm>
             <a:off x="601560" y="374760"/>
-            <a:ext cx="8091720" cy="761760"/>
+            <a:ext cx="8091360" cy="761400"/>
           </a:xfrm>
           <a:prstGeom prst="rect">
             <a:avLst/>
@@ -22331,7 +22260,7 @@
         <p:spPr>
           <a:xfrm>
             <a:off x="2560320" y="1668240"/>
-            <a:ext cx="4309920" cy="1081440"/>
+            <a:ext cx="4309560" cy="1081080"/>
           </a:xfrm>
           <a:prstGeom prst="rect">
             <a:avLst/>
@@ -22353,7 +22282,7 @@
         <p:spPr>
           <a:xfrm>
             <a:off x="1368720" y="3054600"/>
-            <a:ext cx="6856920" cy="3309840"/>
+            <a:ext cx="6856560" cy="3309480"/>
           </a:xfrm>
           <a:prstGeom prst="rect">
             <a:avLst/>
@@ -22380,7 +22309,7 @@
             <a:r>
               <a:rPr b="1" lang="en-US" sz="1800" spc="-1" strike="noStrike">
                 <a:solidFill>
-                  <a:srgbClr val="000000"/>
+                  <a:srgbClr val="ffffff"/>
                 </a:solidFill>
                 <a:latin typeface="Arial"/>
                 <a:ea typeface="DejaVu Sans"/>
@@ -22390,7 +22319,7 @@
             <a:r>
               <a:rPr b="0" lang="en-US" sz="1800" spc="-1" strike="noStrike">
                 <a:solidFill>
-                  <a:srgbClr val="000000"/>
+                  <a:srgbClr val="ffffff"/>
                 </a:solidFill>
                 <a:latin typeface="Arial"/>
                 <a:ea typeface="DejaVu Sans"/>
@@ -22400,7 +22329,7 @@
             <a:r>
               <a:rPr b="1" lang="en-US" sz="1800" spc="-1" strike="noStrike" u="sng">
                 <a:solidFill>
-                  <a:srgbClr val="000000"/>
+                  <a:srgbClr val="ffffff"/>
                 </a:solidFill>
                 <a:uFillTx/>
                 <a:latin typeface="Arial"/>
@@ -22411,7 +22340,7 @@
             <a:r>
               <a:rPr b="0" lang="en-US" sz="1800" spc="-1" strike="noStrike">
                 <a:solidFill>
-                  <a:srgbClr val="000000"/>
+                  <a:srgbClr val="ffffff"/>
                 </a:solidFill>
                 <a:latin typeface="Arial"/>
                 <a:ea typeface="DejaVu Sans"/>
@@ -22421,7 +22350,7 @@
             <a:r>
               <a:rPr b="1" lang="en-US" sz="1800" spc="-1" strike="noStrike" u="sng">
                 <a:solidFill>
-                  <a:srgbClr val="000000"/>
+                  <a:srgbClr val="ffffff"/>
                 </a:solidFill>
                 <a:uFillTx/>
                 <a:latin typeface="Arial"/>
@@ -22963,7 +22892,7 @@
         <p:spPr>
           <a:xfrm>
             <a:off x="601560" y="374760"/>
-            <a:ext cx="8091720" cy="761760"/>
+            <a:ext cx="8091360" cy="761400"/>
           </a:xfrm>
           <a:prstGeom prst="rect">
             <a:avLst/>
@@ -23014,7 +22943,7 @@
         <p:spPr>
           <a:xfrm>
             <a:off x="2493360" y="1465920"/>
-            <a:ext cx="4540680" cy="910440"/>
+            <a:ext cx="4540320" cy="910080"/>
           </a:xfrm>
           <a:prstGeom prst="rect">
             <a:avLst/>
@@ -23054,7 +22983,7 @@
             </a:endParaRPr>
           </a:p>
           <a:p>
-            <a:pPr marL="216000" indent="-214920">
+            <a:pPr marL="216000" indent="-214560">
               <a:lnSpc>
                 <a:spcPct val="100000"/>
               </a:lnSpc>
@@ -23083,7 +23012,7 @@
             </a:endParaRPr>
           </a:p>
           <a:p>
-            <a:pPr marL="216000" indent="-214920">
+            <a:pPr marL="216000" indent="-214560">
               <a:lnSpc>
                 <a:spcPct val="100000"/>
               </a:lnSpc>
@@ -23122,7 +23051,7 @@
         <p:spPr>
           <a:xfrm>
             <a:off x="1005840" y="2527560"/>
-            <a:ext cx="7039800" cy="306000"/>
+            <a:ext cx="7039440" cy="305640"/>
           </a:xfrm>
           <a:prstGeom prst="rect">
             <a:avLst/>
@@ -23171,9 +23100,9 @@
         <p:grpSpPr>
           <a:xfrm>
             <a:off x="825840" y="2855520"/>
-            <a:ext cx="7413480" cy="3107880"/>
+            <a:ext cx="7413120" cy="3107520"/>
             <a:chOff x="825840" y="2855520"/>
-            <a:chExt cx="7413480" cy="3107880"/>
+            <a:chExt cx="7413120" cy="3107520"/>
           </a:xfrm>
         </p:grpSpPr>
         <p:pic>
@@ -23189,7 +23118,7 @@
           <p:spPr>
             <a:xfrm>
               <a:off x="825840" y="2855520"/>
-              <a:ext cx="3528360" cy="3107880"/>
+              <a:ext cx="3528000" cy="3107520"/>
             </a:xfrm>
             <a:prstGeom prst="rect">
               <a:avLst/>
@@ -23215,7 +23144,7 @@
           <p:spPr>
             <a:xfrm>
               <a:off x="4528080" y="2855520"/>
-              <a:ext cx="3711240" cy="3107880"/>
+              <a:ext cx="3710880" cy="3107520"/>
             </a:xfrm>
             <a:prstGeom prst="rect">
               <a:avLst/>
@@ -23287,7 +23216,7 @@
         <p:spPr>
           <a:xfrm>
             <a:off x="601560" y="374760"/>
-            <a:ext cx="8091720" cy="761760"/>
+            <a:ext cx="8091360" cy="761400"/>
           </a:xfrm>
           <a:prstGeom prst="rect">
             <a:avLst/>
@@ -23342,7 +23271,7 @@
         <p:spPr>
           <a:xfrm>
             <a:off x="2560320" y="1668240"/>
-            <a:ext cx="4309920" cy="1081440"/>
+            <a:ext cx="4309560" cy="1081080"/>
           </a:xfrm>
           <a:prstGeom prst="rect">
             <a:avLst/>
@@ -23364,7 +23293,7 @@
         <p:spPr>
           <a:xfrm>
             <a:off x="640080" y="2906280"/>
-            <a:ext cx="8045640" cy="3565800"/>
+            <a:ext cx="8045280" cy="3565440"/>
           </a:xfrm>
           <a:prstGeom prst="rect">
             <a:avLst/>
@@ -23754,7 +23683,7 @@
         <p:spPr>
           <a:xfrm>
             <a:off x="601560" y="374760"/>
-            <a:ext cx="8091720" cy="761760"/>
+            <a:ext cx="8091360" cy="761400"/>
           </a:xfrm>
           <a:prstGeom prst="rect">
             <a:avLst/>
@@ -23809,7 +23738,7 @@
         <p:spPr>
           <a:xfrm>
             <a:off x="667080" y="2247120"/>
-            <a:ext cx="3992400" cy="1571760"/>
+            <a:ext cx="3992040" cy="1571400"/>
           </a:xfrm>
           <a:prstGeom prst="rect">
             <a:avLst/>
@@ -23835,7 +23764,7 @@
         <p:spPr>
           <a:xfrm>
             <a:off x="4991040" y="1609920"/>
-            <a:ext cx="3528360" cy="3107880"/>
+            <a:ext cx="3528000" cy="3107520"/>
           </a:xfrm>
           <a:prstGeom prst="rect">
             <a:avLst/>
@@ -23856,7 +23785,7 @@
         </p:nvGraphicFramePr>
         <p:xfrm>
           <a:off x="507960" y="5053320"/>
-          <a:ext cx="5119920" cy="1554120"/>
+          <a:ext cx="5119920" cy="1553760"/>
         </p:xfrm>
         <a:graphic>
           <a:graphicData uri="http://schemas.openxmlformats.org/drawingml/2006/table">
@@ -24982,7 +24911,7 @@
                   </a:tcPr>
                 </a:tc>
               </a:tr>
-              <a:tr h="317880">
+              <a:tr h="317520">
                 <a:tc>
                   <a:txBody>
                     <a:bodyPr lIns="90000" rIns="90000"/>
@@ -25273,7 +25202,7 @@
         <p:spPr>
           <a:xfrm>
             <a:off x="404640" y="4732560"/>
-            <a:ext cx="3382200" cy="289080"/>
+            <a:ext cx="3381840" cy="288720"/>
           </a:xfrm>
           <a:prstGeom prst="rect">
             <a:avLst/>
@@ -25322,7 +25251,7 @@
         <p:spPr>
           <a:xfrm>
             <a:off x="5807880" y="4993200"/>
-            <a:ext cx="533520" cy="1644840"/>
+            <a:ext cx="533160" cy="1644480"/>
           </a:xfrm>
           <a:custGeom>
             <a:avLst/>
@@ -25387,7 +25316,7 @@
         <p:spPr>
           <a:xfrm>
             <a:off x="6495120" y="5486400"/>
-            <a:ext cx="2010600" cy="639000"/>
+            <a:ext cx="2010240" cy="638640"/>
           </a:xfrm>
           <a:prstGeom prst="rect">
             <a:avLst/>
@@ -25460,7 +25389,7 @@
         <p:spPr>
           <a:xfrm>
             <a:off x="692640" y="1924560"/>
-            <a:ext cx="3969720" cy="488880"/>
+            <a:ext cx="3969360" cy="488520"/>
           </a:xfrm>
           <a:prstGeom prst="rect">
             <a:avLst/>
@@ -25558,7 +25487,7 @@
         <p:spPr>
           <a:xfrm>
             <a:off x="997560" y="374760"/>
-            <a:ext cx="8091720" cy="761760"/>
+            <a:ext cx="8091360" cy="761400"/>
           </a:xfrm>
           <a:prstGeom prst="rect">
             <a:avLst/>
@@ -25609,7 +25538,7 @@
         <p:spPr>
           <a:xfrm>
             <a:off x="1172160" y="1685160"/>
-            <a:ext cx="7497000" cy="1295280"/>
+            <a:ext cx="7496640" cy="1294920"/>
           </a:xfrm>
           <a:prstGeom prst="rect">
             <a:avLst/>
@@ -25628,7 +25557,7 @@
         <p:txBody>
           <a:bodyPr lIns="90000" rIns="90000" tIns="45000" bIns="45000"/>
           <a:p>
-            <a:pPr marL="216000" indent="-214920">
+            <a:pPr marL="216000" indent="-214560">
               <a:lnSpc>
                 <a:spcPct val="100000"/>
               </a:lnSpc>
@@ -25664,7 +25593,7 @@
             </a:endParaRPr>
           </a:p>
           <a:p>
-            <a:pPr marL="216000" indent="-214920">
+            <a:pPr marL="216000" indent="-214560">
               <a:lnSpc>
                 <a:spcPct val="100000"/>
               </a:lnSpc>
@@ -25710,7 +25639,7 @@
         <p:spPr>
           <a:xfrm>
             <a:off x="1172160" y="6015600"/>
-            <a:ext cx="7497000" cy="456120"/>
+            <a:ext cx="7496640" cy="455760"/>
           </a:xfrm>
           <a:prstGeom prst="rect">
             <a:avLst/>
@@ -25729,7 +25658,7 @@
         <p:txBody>
           <a:bodyPr lIns="90000" rIns="90000" tIns="45000" bIns="45000"/>
           <a:p>
-            <a:pPr marL="216000" indent="-214920">
+            <a:pPr marL="216000" indent="-214560">
               <a:lnSpc>
                 <a:spcPct val="100000"/>
               </a:lnSpc>
@@ -25769,7 +25698,7 @@
         <p:spPr>
           <a:xfrm>
             <a:off x="1975320" y="3053520"/>
-            <a:ext cx="5992560" cy="2920320"/>
+            <a:ext cx="5992200" cy="2919960"/>
           </a:xfrm>
           <a:prstGeom prst="rect">
             <a:avLst/>
@@ -25791,7 +25720,7 @@
         <p:spPr>
           <a:xfrm>
             <a:off x="202320" y="3998160"/>
-            <a:ext cx="1644840" cy="730440"/>
+            <a:ext cx="1644480" cy="730080"/>
           </a:xfrm>
           <a:prstGeom prst="rect">
             <a:avLst/>
@@ -25889,7 +25818,7 @@
         <p:spPr>
           <a:xfrm>
             <a:off x="997560" y="374760"/>
-            <a:ext cx="8091720" cy="761760"/>
+            <a:ext cx="8091360" cy="761400"/>
           </a:xfrm>
           <a:prstGeom prst="rect">
             <a:avLst/>
@@ -25970,7 +25899,7 @@
         <p:spPr>
           <a:xfrm>
             <a:off x="1280160" y="4563000"/>
-            <a:ext cx="6765480" cy="1562400"/>
+            <a:ext cx="6765120" cy="1562040"/>
           </a:xfrm>
           <a:prstGeom prst="rect">
             <a:avLst/>
@@ -25989,7 +25918,7 @@
         <p:txBody>
           <a:bodyPr lIns="90000" rIns="90000" tIns="45000" bIns="45000"/>
           <a:p>
-            <a:pPr marL="216000" indent="-214920">
+            <a:pPr marL="216000" indent="-214560">
               <a:lnSpc>
                 <a:spcPct val="100000"/>
               </a:lnSpc>
@@ -26018,7 +25947,7 @@
             </a:endParaRPr>
           </a:p>
           <a:p>
-            <a:pPr marL="216000" indent="-214920">
+            <a:pPr marL="216000" indent="-214560">
               <a:lnSpc>
                 <a:spcPct val="100000"/>
               </a:lnSpc>
@@ -26047,7 +25976,7 @@
             </a:endParaRPr>
           </a:p>
           <a:p>
-            <a:pPr marL="216000" indent="-214920">
+            <a:pPr marL="216000" indent="-214560">
               <a:lnSpc>
                 <a:spcPct val="100000"/>
               </a:lnSpc>
@@ -26086,7 +26015,7 @@
             </a:endParaRPr>
           </a:p>
           <a:p>
-            <a:pPr marL="216000" indent="-214920">
+            <a:pPr marL="216000" indent="-214560">
               <a:lnSpc>
                 <a:spcPct val="100000"/>
               </a:lnSpc>
@@ -26139,7 +26068,7 @@
         <p:spPr>
           <a:xfrm>
             <a:off x="2125080" y="1583280"/>
-            <a:ext cx="5244480" cy="2619000"/>
+            <a:ext cx="5244120" cy="2618640"/>
           </a:xfrm>
           <a:prstGeom prst="rect">
             <a:avLst/>
@@ -26161,7 +26090,7 @@
         <p:spPr>
           <a:xfrm>
             <a:off x="4608000" y="2707200"/>
-            <a:ext cx="456120" cy="456120"/>
+            <a:ext cx="455760" cy="455760"/>
           </a:xfrm>
           <a:prstGeom prst="ellipse">
             <a:avLst/>
@@ -26218,7 +26147,7 @@
         <p:spPr>
           <a:xfrm>
             <a:off x="4389120" y="2011680"/>
-            <a:ext cx="2010600" cy="747000"/>
+            <a:ext cx="2010240" cy="746640"/>
           </a:xfrm>
           <a:prstGeom prst="rect">
             <a:avLst/>
@@ -26359,7 +26288,7 @@
         <p:spPr>
           <a:xfrm>
             <a:off x="601560" y="374760"/>
-            <a:ext cx="8091720" cy="761760"/>
+            <a:ext cx="8091360" cy="761400"/>
           </a:xfrm>
           <a:prstGeom prst="rect">
             <a:avLst/>
@@ -26410,7 +26339,7 @@
         <p:spPr>
           <a:xfrm>
             <a:off x="731520" y="3687120"/>
-            <a:ext cx="3659400" cy="539280"/>
+            <a:ext cx="3659040" cy="538920"/>
           </a:xfrm>
           <a:prstGeom prst="rect">
             <a:avLst/>
@@ -26461,7 +26390,7 @@
         <p:spPr>
           <a:xfrm>
             <a:off x="4494240" y="2936520"/>
-            <a:ext cx="4014720" cy="2365920"/>
+            <a:ext cx="4014360" cy="2365560"/>
           </a:xfrm>
           <a:prstGeom prst="rect">
             <a:avLst/>
@@ -26482,7 +26411,7 @@
             <a:normAutofit/>
           </a:bodyPr>
           <a:p>
-            <a:pPr marL="432000" indent="-322920">
+            <a:pPr marL="432000" indent="-322560">
               <a:lnSpc>
                 <a:spcPct val="115000"/>
               </a:lnSpc>
@@ -26511,7 +26440,7 @@
             </a:endParaRPr>
           </a:p>
           <a:p>
-            <a:pPr marL="432000" indent="-322920">
+            <a:pPr marL="432000" indent="-322560">
               <a:lnSpc>
                 <a:spcPct val="115000"/>
               </a:lnSpc>
@@ -26540,7 +26469,7 @@
             </a:endParaRPr>
           </a:p>
           <a:p>
-            <a:pPr marL="432000" indent="-322920">
+            <a:pPr marL="432000" indent="-322560">
               <a:lnSpc>
                 <a:spcPct val="115000"/>
               </a:lnSpc>
@@ -26569,7 +26498,7 @@
             </a:endParaRPr>
           </a:p>
           <a:p>
-            <a:pPr marL="432000" indent="-322920">
+            <a:pPr marL="432000" indent="-322560">
               <a:lnSpc>
                 <a:spcPct val="115000"/>
               </a:lnSpc>
@@ -26687,7 +26616,7 @@
         <p:spPr>
           <a:xfrm>
             <a:off x="997560" y="374760"/>
-            <a:ext cx="8091720" cy="761760"/>
+            <a:ext cx="8091360" cy="761400"/>
           </a:xfrm>
           <a:prstGeom prst="rect">
             <a:avLst/>
@@ -26758,7 +26687,7 @@
         <p:spPr>
           <a:xfrm>
             <a:off x="2394000" y="5852160"/>
-            <a:ext cx="4662360" cy="373680"/>
+            <a:ext cx="4662000" cy="373320"/>
           </a:xfrm>
           <a:prstGeom prst="rect">
             <a:avLst/>
@@ -26777,7 +26706,7 @@
         <p:txBody>
           <a:bodyPr lIns="90000" rIns="90000" tIns="45000" bIns="45000"/>
           <a:p>
-            <a:pPr marL="216000" indent="-214920">
+            <a:pPr marL="216000" indent="-214560">
               <a:lnSpc>
                 <a:spcPct val="100000"/>
               </a:lnSpc>
@@ -26820,7 +26749,7 @@
         <p:spPr>
           <a:xfrm>
             <a:off x="849240" y="1892520"/>
-            <a:ext cx="7612560" cy="3861360"/>
+            <a:ext cx="7612200" cy="3861000"/>
           </a:xfrm>
           <a:prstGeom prst="rect">
             <a:avLst/>
@@ -26891,7 +26820,7 @@
         <p:spPr>
           <a:xfrm>
             <a:off x="601560" y="374760"/>
-            <a:ext cx="8075160" cy="761760"/>
+            <a:ext cx="8074800" cy="761400"/>
           </a:xfrm>
           <a:prstGeom prst="rect">
             <a:avLst/>
@@ -26946,7 +26875,7 @@
         <p:spPr>
           <a:xfrm>
             <a:off x="2546640" y="1962360"/>
-            <a:ext cx="5756040" cy="2984040"/>
+            <a:ext cx="5755680" cy="2983680"/>
           </a:xfrm>
           <a:prstGeom prst="rect">
             <a:avLst/>
@@ -26968,7 +26897,7 @@
         <p:spPr>
           <a:xfrm>
             <a:off x="1758960" y="5074200"/>
-            <a:ext cx="7289640" cy="995760"/>
+            <a:ext cx="7289280" cy="995400"/>
           </a:xfrm>
           <a:prstGeom prst="rect">
             <a:avLst/>
@@ -26987,7 +26916,7 @@
         <p:txBody>
           <a:bodyPr lIns="90000" rIns="90000" tIns="45000" bIns="45000"/>
           <a:p>
-            <a:pPr marL="216000" indent="-214920">
+            <a:pPr marL="216000" indent="-214560">
               <a:lnSpc>
                 <a:spcPct val="100000"/>
               </a:lnSpc>
@@ -27016,7 +26945,7 @@
             </a:endParaRPr>
           </a:p>
           <a:p>
-            <a:pPr marL="216000" indent="-214920">
+            <a:pPr marL="216000" indent="-214560">
               <a:lnSpc>
                 <a:spcPct val="100000"/>
               </a:lnSpc>
@@ -27045,7 +26974,7 @@
             </a:endParaRPr>
           </a:p>
           <a:p>
-            <a:pPr marL="216000" indent="-214920">
+            <a:pPr marL="216000" indent="-214560">
               <a:lnSpc>
                 <a:spcPct val="100000"/>
               </a:lnSpc>
@@ -27084,7 +27013,7 @@
         <p:spPr>
           <a:xfrm>
             <a:off x="2676240" y="1316520"/>
-            <a:ext cx="5485320" cy="607680"/>
+            <a:ext cx="5484960" cy="607320"/>
           </a:xfrm>
           <a:prstGeom prst="rect">
             <a:avLst/>
@@ -27159,7 +27088,7 @@
         <p:spPr>
           <a:xfrm>
             <a:off x="274320" y="2252880"/>
-            <a:ext cx="2102040" cy="1775160"/>
+            <a:ext cx="2101680" cy="1774800"/>
           </a:xfrm>
           <a:prstGeom prst="rect">
             <a:avLst/>
@@ -27298,7 +27227,7 @@
             <a:r>
               <a:rPr b="1" lang="en-US" sz="1600" spc="-1" strike="noStrike">
                 <a:solidFill>
-                  <a:srgbClr val="e0efd4"/>
+                  <a:srgbClr val="ffffff"/>
                 </a:solidFill>
                 <a:latin typeface="Arial"/>
                 <a:ea typeface="DejaVu Sans"/>
@@ -27399,7 +27328,7 @@
         <p:spPr>
           <a:xfrm>
             <a:off x="601560" y="374760"/>
-            <a:ext cx="8075160" cy="761760"/>
+            <a:ext cx="8074800" cy="761400"/>
           </a:xfrm>
           <a:prstGeom prst="rect">
             <a:avLst/>
@@ -27450,7 +27379,7 @@
         <p:spPr>
           <a:xfrm>
             <a:off x="1758960" y="5074200"/>
-            <a:ext cx="7289640" cy="1211400"/>
+            <a:ext cx="7289280" cy="1211040"/>
           </a:xfrm>
           <a:prstGeom prst="rect">
             <a:avLst/>
@@ -27469,7 +27398,7 @@
         <p:txBody>
           <a:bodyPr lIns="90000" rIns="90000" tIns="45000" bIns="45000"/>
           <a:p>
-            <a:pPr marL="216000" indent="-214920">
+            <a:pPr marL="216000" indent="-214560">
               <a:lnSpc>
                 <a:spcPct val="100000"/>
               </a:lnSpc>
@@ -27498,7 +27427,7 @@
             </a:endParaRPr>
           </a:p>
           <a:p>
-            <a:pPr marL="216000" indent="-214920">
+            <a:pPr marL="216000" indent="-214560">
               <a:lnSpc>
                 <a:spcPct val="100000"/>
               </a:lnSpc>
@@ -27527,7 +27456,7 @@
             </a:endParaRPr>
           </a:p>
           <a:p>
-            <a:pPr marL="216000" indent="-214920">
+            <a:pPr marL="216000" indent="-214560">
               <a:lnSpc>
                 <a:spcPct val="100000"/>
               </a:lnSpc>
@@ -27556,7 +27485,7 @@
             </a:endParaRPr>
           </a:p>
           <a:p>
-            <a:pPr marL="216000" indent="-214920">
+            <a:pPr marL="216000" indent="-214560">
               <a:lnSpc>
                 <a:spcPct val="100000"/>
               </a:lnSpc>
@@ -27578,7 +27507,7 @@
                 <a:latin typeface="Arial"/>
                 <a:ea typeface="DejaVu Sans"/>
               </a:rPr>
-              <a:t>Logloss errors were best for Pitchers who throw 5 or more pitch-types.</a:t>
+              <a:t>Logloss errors were best for Pitchers who throw &gt;=5 different pitch-types.</a:t>
             </a:r>
             <a:endParaRPr b="0" lang="en-US" sz="1600" spc="-1" strike="noStrike">
               <a:latin typeface="Arial"/>
@@ -27595,7 +27524,7 @@
         <p:spPr>
           <a:xfrm>
             <a:off x="2676240" y="1316520"/>
-            <a:ext cx="5485320" cy="607680"/>
+            <a:ext cx="5484960" cy="607320"/>
           </a:xfrm>
           <a:prstGeom prst="rect">
             <a:avLst/>
@@ -27670,7 +27599,7 @@
         <p:spPr>
           <a:xfrm>
             <a:off x="274320" y="2252880"/>
-            <a:ext cx="2102040" cy="1775160"/>
+            <a:ext cx="2101680" cy="1774800"/>
           </a:xfrm>
           <a:prstGeom prst="rect">
             <a:avLst/>
@@ -27865,7 +27794,7 @@
         <p:spPr>
           <a:xfrm>
             <a:off x="2554560" y="1939680"/>
-            <a:ext cx="5759640" cy="2989080"/>
+            <a:ext cx="5759280" cy="2988720"/>
           </a:xfrm>
           <a:prstGeom prst="rect">
             <a:avLst/>
@@ -27936,7 +27865,7 @@
         <p:spPr>
           <a:xfrm>
             <a:off x="601560" y="374760"/>
-            <a:ext cx="8075160" cy="761760"/>
+            <a:ext cx="8074800" cy="761400"/>
           </a:xfrm>
           <a:prstGeom prst="rect">
             <a:avLst/>
@@ -27987,7 +27916,7 @@
         <p:spPr>
           <a:xfrm>
             <a:off x="731520" y="1939680"/>
-            <a:ext cx="7771320" cy="4102560"/>
+            <a:ext cx="7770960" cy="4102200"/>
           </a:xfrm>
           <a:prstGeom prst="rect">
             <a:avLst/>
@@ -28006,7 +27935,7 @@
         <p:txBody>
           <a:bodyPr lIns="90000" rIns="90000" tIns="45000" bIns="45000"/>
           <a:p>
-            <a:pPr marL="216000" indent="-214920">
+            <a:pPr marL="216000" indent="-214560">
               <a:lnSpc>
                 <a:spcPct val="100000"/>
               </a:lnSpc>
@@ -28038,7 +27967,7 @@
             </a:endParaRPr>
           </a:p>
           <a:p>
-            <a:pPr marL="216000" indent="-214920">
+            <a:pPr marL="216000" indent="-214560">
               <a:lnSpc>
                 <a:spcPct val="100000"/>
               </a:lnSpc>
@@ -28070,7 +27999,7 @@
             </a:endParaRPr>
           </a:p>
           <a:p>
-            <a:pPr marL="216000" indent="-214920">
+            <a:pPr marL="216000" indent="-214560">
               <a:lnSpc>
                 <a:spcPct val="100000"/>
               </a:lnSpc>
@@ -28101,7 +28030,7 @@
             </a:endParaRPr>
           </a:p>
           <a:p>
-            <a:pPr marL="216000" indent="-214920">
+            <a:pPr marL="216000" indent="-214560">
               <a:lnSpc>
                 <a:spcPct val="100000"/>
               </a:lnSpc>
@@ -28132,7 +28061,7 @@
             </a:endParaRPr>
           </a:p>
           <a:p>
-            <a:pPr marL="216000" indent="-214920">
+            <a:pPr marL="216000" indent="-214560">
               <a:lnSpc>
                 <a:spcPct val="100000"/>
               </a:lnSpc>
@@ -28222,7 +28151,7 @@
         <p:spPr>
           <a:xfrm>
             <a:off x="601560" y="374760"/>
-            <a:ext cx="8075160" cy="761760"/>
+            <a:ext cx="8074800" cy="761400"/>
           </a:xfrm>
           <a:prstGeom prst="rect">
             <a:avLst/>
@@ -28273,7 +28202,7 @@
         <p:spPr>
           <a:xfrm>
             <a:off x="731520" y="2335680"/>
-            <a:ext cx="7771320" cy="3021120"/>
+            <a:ext cx="7770960" cy="3020760"/>
           </a:xfrm>
           <a:prstGeom prst="rect">
             <a:avLst/>
@@ -28292,7 +28221,7 @@
         <p:txBody>
           <a:bodyPr lIns="90000" rIns="90000" tIns="45000" bIns="45000"/>
           <a:p>
-            <a:pPr marL="216000" indent="-214920">
+            <a:pPr marL="216000" indent="-214560">
               <a:lnSpc>
                 <a:spcPct val="100000"/>
               </a:lnSpc>
@@ -28324,7 +28253,7 @@
             </a:endParaRPr>
           </a:p>
           <a:p>
-            <a:pPr marL="216000" indent="-214920">
+            <a:pPr marL="216000" indent="-214560">
               <a:lnSpc>
                 <a:spcPct val="100000"/>
               </a:lnSpc>
@@ -28349,14 +28278,14 @@
                 <a:latin typeface="Arial"/>
                 <a:ea typeface="Noto Sans CJK SC Regular"/>
               </a:rPr>
-              <a:t>Select a subset of hitter to essentially perform a randomized controlled trial to estimate the effect size (ROI).</a:t>
+              <a:t>Select a subset of hitters to essentially perform a randomized controlled trial to estimate the effect size (ROI).</a:t>
             </a:r>
             <a:endParaRPr b="0" lang="en-US" sz="2200" spc="-1" strike="noStrike">
               <a:latin typeface="Arial"/>
             </a:endParaRPr>
           </a:p>
           <a:p>
-            <a:pPr marL="216000" indent="-214920">
+            <a:pPr marL="216000" indent="-214560">
               <a:lnSpc>
                 <a:spcPct val="100000"/>
               </a:lnSpc>
@@ -28388,7 +28317,7 @@
             </a:endParaRPr>
           </a:p>
           <a:p>
-            <a:pPr marL="216000" indent="-214920">
+            <a:pPr marL="216000" indent="-214560">
               <a:lnSpc>
                 <a:spcPct val="100000"/>
               </a:lnSpc>
@@ -28478,7 +28407,7 @@
         <p:spPr>
           <a:xfrm>
             <a:off x="601560" y="374760"/>
-            <a:ext cx="8075160" cy="761760"/>
+            <a:ext cx="8074800" cy="761400"/>
           </a:xfrm>
           <a:prstGeom prst="rect">
             <a:avLst/>
@@ -28529,7 +28458,7 @@
         <p:spPr>
           <a:xfrm>
             <a:off x="731520" y="1920240"/>
-            <a:ext cx="7771320" cy="3619440"/>
+            <a:ext cx="7770960" cy="3619080"/>
           </a:xfrm>
           <a:prstGeom prst="rect">
             <a:avLst/>
@@ -28548,7 +28477,7 @@
         <p:txBody>
           <a:bodyPr lIns="90000" rIns="90000" tIns="45000" bIns="45000"/>
           <a:p>
-            <a:pPr marL="216000" indent="-214920">
+            <a:pPr marL="216000" indent="-214560">
               <a:lnSpc>
                 <a:spcPct val="100000"/>
               </a:lnSpc>
@@ -28600,7 +28529,7 @@
             </a:endParaRPr>
           </a:p>
           <a:p>
-            <a:pPr marL="216000" indent="-214920">
+            <a:pPr marL="216000" indent="-214560">
               <a:lnSpc>
                 <a:spcPct val="100000"/>
               </a:lnSpc>
@@ -28642,7 +28571,7 @@
             </a:endParaRPr>
           </a:p>
           <a:p>
-            <a:pPr marL="216000" indent="-214920">
+            <a:pPr marL="216000" indent="-214560">
               <a:lnSpc>
                 <a:spcPct val="100000"/>
               </a:lnSpc>
@@ -28693,14 +28622,14 @@
                 <a:latin typeface="Arial"/>
                 <a:ea typeface="Noto Sans CJK SC Regular"/>
               </a:rPr>
-              <a:t>Pitch-type + Pitch Group + Pitch Location </a:t>
+              <a:t>Pitch-type + Pitch Group + Pitch Speed + Pitch Location </a:t>
             </a:r>
             <a:endParaRPr b="0" lang="en-US" sz="1800" spc="-1" strike="noStrike">
               <a:latin typeface="Arial"/>
             </a:endParaRPr>
           </a:p>
           <a:p>
-            <a:pPr marL="216000" indent="-214920">
+            <a:pPr marL="216000" indent="-214560">
               <a:lnSpc>
                 <a:spcPct val="100000"/>
               </a:lnSpc>
@@ -28790,15 +28719,19 @@
         </p:nvSpPr>
         <p:spPr>
           <a:xfrm>
-            <a:off x="601560" y="374760"/>
-            <a:ext cx="8075160" cy="761760"/>
-          </a:xfrm>
-          <a:prstGeom prst="rect">
-            <a:avLst/>
-          </a:prstGeom>
-          <a:noFill/>
+            <a:off x="676080" y="2172240"/>
+            <a:ext cx="7772400" cy="3200400"/>
+          </a:xfrm>
+          <a:prstGeom prst="rect">
+            <a:avLst/>
+          </a:prstGeom>
+          <a:solidFill>
+            <a:srgbClr val="ffffff"/>
+          </a:solidFill>
           <a:ln>
-            <a:noFill/>
+            <a:solidFill>
+              <a:srgbClr val="3465a4"/>
+            </a:solidFill>
           </a:ln>
         </p:spPr>
         <p:style>
@@ -28807,31 +28740,6 @@
           <a:effectRef idx="0"/>
           <a:fontRef idx="minor"/>
         </p:style>
-        <p:txBody>
-          <a:bodyPr lIns="90000" rIns="90000" tIns="45000" bIns="45000" anchor="ctr">
-            <a:normAutofit/>
-          </a:bodyPr>
-          <a:p>
-            <a:pPr algn="r">
-              <a:lnSpc>
-                <a:spcPct val="100000"/>
-              </a:lnSpc>
-            </a:pPr>
-            <a:r>
-              <a:rPr b="0" lang="en-US" sz="3600" spc="-1" strike="noStrike">
-                <a:solidFill>
-                  <a:srgbClr val="fac090"/>
-                </a:solidFill>
-                <a:latin typeface="Calibri"/>
-                <a:ea typeface="DejaVu Sans"/>
-              </a:rPr>
-              <a:t>Questions?</a:t>
-            </a:r>
-            <a:endParaRPr b="0" lang="en-US" sz="3600" spc="-1" strike="noStrike">
-              <a:latin typeface="Arial"/>
-            </a:endParaRPr>
-          </a:p>
-        </p:txBody>
       </p:sp>
       <p:sp>
         <p:nvSpPr>
@@ -28841,8 +28749,8 @@
         </p:nvSpPr>
         <p:spPr>
           <a:xfrm>
-            <a:off x="731520" y="1920240"/>
-            <a:ext cx="7770960" cy="3619080"/>
+            <a:off x="601560" y="374760"/>
+            <a:ext cx="8074800" cy="761400"/>
           </a:xfrm>
           <a:prstGeom prst="rect">
             <a:avLst/>
@@ -28859,6 +28767,57 @@
           <a:fontRef idx="minor"/>
         </p:style>
         <p:txBody>
+          <a:bodyPr lIns="90000" rIns="90000" tIns="45000" bIns="45000" anchor="ctr">
+            <a:normAutofit/>
+          </a:bodyPr>
+          <a:p>
+            <a:pPr algn="r">
+              <a:lnSpc>
+                <a:spcPct val="100000"/>
+              </a:lnSpc>
+            </a:pPr>
+            <a:r>
+              <a:rPr b="0" lang="en-US" sz="3600" spc="-1" strike="noStrike">
+                <a:solidFill>
+                  <a:srgbClr val="fac090"/>
+                </a:solidFill>
+                <a:latin typeface="Calibri"/>
+                <a:ea typeface="DejaVu Sans"/>
+              </a:rPr>
+              <a:t>Questions?</a:t>
+            </a:r>
+            <a:endParaRPr b="0" lang="en-US" sz="3600" spc="-1" strike="noStrike">
+              <a:latin typeface="Arial"/>
+            </a:endParaRPr>
+          </a:p>
+        </p:txBody>
+      </p:sp>
+      <p:sp>
+        <p:nvSpPr>
+          <p:cNvPr id="472" name="CustomShape 3"/>
+          <p:cNvSpPr/>
+          <p:nvPr/>
+        </p:nvSpPr>
+        <p:spPr>
+          <a:xfrm>
+            <a:off x="767520" y="2172240"/>
+            <a:ext cx="7770600" cy="3618720"/>
+          </a:xfrm>
+          <a:prstGeom prst="rect">
+            <a:avLst/>
+          </a:prstGeom>
+          <a:noFill/>
+          <a:ln>
+            <a:noFill/>
+          </a:ln>
+        </p:spPr>
+        <p:style>
+          <a:lnRef idx="0"/>
+          <a:fillRef idx="0"/>
+          <a:effectRef idx="0"/>
+          <a:fontRef idx="minor"/>
+        </p:style>
+        <p:txBody>
           <a:bodyPr lIns="90000" rIns="90000" tIns="45000" bIns="45000"/>
           <a:p>
             <a:pPr>
@@ -28875,7 +28834,7 @@
             <a:r>
               <a:rPr b="1" lang="en-US" sz="2600" spc="-1" strike="noStrike">
                 <a:solidFill>
-                  <a:srgbClr val="ffffff"/>
+                  <a:srgbClr val="000000"/>
                 </a:solidFill>
                 <a:latin typeface="Arial"/>
                 <a:ea typeface="Noto Sans CJK SC Regular"/>
@@ -28883,6 +28842,9 @@
               <a:t>Mark Rojas</a:t>
             </a:r>
             <a:endParaRPr b="0" lang="en-US" sz="2600" spc="-1" strike="noStrike">
+              <a:solidFill>
+                <a:srgbClr val="000000"/>
+              </a:solidFill>
               <a:latin typeface="Arial"/>
             </a:endParaRPr>
           </a:p>
@@ -28901,7 +28863,7 @@
             <a:r>
               <a:rPr b="0" lang="en-US" sz="1600" spc="-1" strike="noStrike">
                 <a:solidFill>
-                  <a:srgbClr val="ffffff"/>
+                  <a:srgbClr val="000000"/>
                 </a:solidFill>
                 <a:latin typeface="Arial"/>
                 <a:ea typeface="Noto Sans CJK SC Regular"/>
@@ -28909,6 +28871,9 @@
               <a:t>Cell: (832) 330-2870</a:t>
             </a:r>
             <a:endParaRPr b="0" lang="en-US" sz="1600" spc="-1" strike="noStrike">
+              <a:solidFill>
+                <a:srgbClr val="000000"/>
+              </a:solidFill>
               <a:latin typeface="Arial"/>
             </a:endParaRPr>
           </a:p>
@@ -28927,7 +28892,7 @@
             <a:r>
               <a:rPr b="0" lang="en-US" sz="1600" spc="-1" strike="noStrike">
                 <a:solidFill>
-                  <a:srgbClr val="ffffff"/>
+                  <a:srgbClr val="000000"/>
                 </a:solidFill>
                 <a:latin typeface="Arial"/>
                 <a:ea typeface="Noto Sans CJK SC Regular"/>
@@ -28937,7 +28902,7 @@
             <a:r>
               <a:rPr b="0" lang="en-US" sz="1600" spc="-1" strike="noStrike" u="sng">
                 <a:solidFill>
-                  <a:srgbClr val="0000ff"/>
+                  <a:srgbClr val="1b75bc"/>
                 </a:solidFill>
                 <a:uFillTx/>
                 <a:latin typeface="Arial"/>
@@ -28947,6 +28912,9 @@
               <a:t>rojas.mm@gmail.com</a:t>
             </a:r>
             <a:endParaRPr b="0" lang="en-US" sz="1600" spc="-1" strike="noStrike">
+              <a:solidFill>
+                <a:srgbClr val="000000"/>
+              </a:solidFill>
               <a:latin typeface="Arial"/>
             </a:endParaRPr>
           </a:p>
@@ -28965,14 +28933,27 @@
             <a:r>
               <a:rPr b="0" lang="en-US" sz="1600" spc="-1" strike="noStrike">
                 <a:solidFill>
-                  <a:srgbClr val="ffffff"/>
+                  <a:srgbClr val="000000"/>
                 </a:solidFill>
                 <a:latin typeface="Arial"/>
                 <a:ea typeface="Noto Sans CJK SC Regular"/>
               </a:rPr>
-              <a:t>Skype: markrojas</a:t>
+              <a:t>Skype: </a:t>
+            </a:r>
+            <a:r>
+              <a:rPr b="0" lang="en-US" sz="1600" spc="-1" strike="noStrike">
+                <a:solidFill>
+                  <a:srgbClr val="1b75bc"/>
+                </a:solidFill>
+                <a:latin typeface="Arial"/>
+                <a:ea typeface="Noto Sans CJK SC Regular"/>
+              </a:rPr>
+              <a:t>markrojas</a:t>
             </a:r>
             <a:endParaRPr b="0" lang="en-US" sz="1600" spc="-1" strike="noStrike">
+              <a:solidFill>
+                <a:srgbClr val="000000"/>
+              </a:solidFill>
               <a:latin typeface="Arial"/>
             </a:endParaRPr>
           </a:p>
@@ -28991,7 +28972,7 @@
             <a:r>
               <a:rPr b="0" lang="en-US" sz="1600" spc="-1" strike="noStrike">
                 <a:solidFill>
-                  <a:srgbClr val="ffffff"/>
+                  <a:srgbClr val="000000"/>
                 </a:solidFill>
                 <a:latin typeface="Arial"/>
                 <a:ea typeface="Noto Sans CJK SC Regular"/>
@@ -29001,7 +28982,7 @@
             <a:r>
               <a:rPr b="0" lang="en-US" sz="1600" spc="-1" strike="noStrike" u="sng">
                 <a:solidFill>
-                  <a:srgbClr val="0000ff"/>
+                  <a:srgbClr val="1b75bc"/>
                 </a:solidFill>
                 <a:uFillTx/>
                 <a:latin typeface="Arial"/>
@@ -29011,6 +28992,9 @@
               <a:t>https://www.linkedin.com/in/mark-rojas/</a:t>
             </a:r>
             <a:endParaRPr b="0" lang="en-US" sz="1600" spc="-1" strike="noStrike">
+              <a:solidFill>
+                <a:srgbClr val="000000"/>
+              </a:solidFill>
               <a:latin typeface="Arial"/>
             </a:endParaRPr>
           </a:p>
@@ -29029,7 +29013,7 @@
             <a:r>
               <a:rPr b="0" lang="en-US" sz="1600" spc="-1" strike="noStrike">
                 <a:solidFill>
-                  <a:srgbClr val="ffffff"/>
+                  <a:srgbClr val="000000"/>
                 </a:solidFill>
                 <a:latin typeface="Arial"/>
                 <a:ea typeface="Noto Sans CJK SC Regular"/>
@@ -29039,7 +29023,7 @@
             <a:r>
               <a:rPr b="0" lang="en-US" sz="1600" spc="-1" strike="noStrike" u="sng">
                 <a:solidFill>
-                  <a:srgbClr val="0000ff"/>
+                  <a:srgbClr val="1b75bc"/>
                 </a:solidFill>
                 <a:uFillTx/>
                 <a:latin typeface="Arial"/>
@@ -29049,6 +29033,9 @@
               <a:t>https://github.com/markrojas</a:t>
             </a:r>
             <a:endParaRPr b="0" lang="en-US" sz="1600" spc="-1" strike="noStrike">
+              <a:solidFill>
+                <a:srgbClr val="000000"/>
+              </a:solidFill>
               <a:latin typeface="Arial"/>
             </a:endParaRPr>
           </a:p>
@@ -29067,7 +29054,7 @@
             <a:r>
               <a:rPr b="0" lang="en-US" sz="1600" spc="-1" strike="noStrike">
                 <a:solidFill>
-                  <a:srgbClr val="ffffff"/>
+                  <a:srgbClr val="000000"/>
                 </a:solidFill>
                 <a:latin typeface="Arial"/>
                 <a:ea typeface="Noto Sans CJK SC Regular"/>
@@ -29075,6 +29062,9 @@
               <a:t>Pitch Prediction Repository: </a:t>
             </a:r>
             <a:endParaRPr b="0" lang="en-US" sz="1600" spc="-1" strike="noStrike">
+              <a:solidFill>
+                <a:srgbClr val="000000"/>
+              </a:solidFill>
               <a:latin typeface="Arial"/>
             </a:endParaRPr>
           </a:p>
@@ -29093,7 +29083,7 @@
             <a:r>
               <a:rPr b="0" lang="en-US" sz="1400" spc="-1" strike="noStrike" u="sng">
                 <a:solidFill>
-                  <a:srgbClr val="0000ff"/>
+                  <a:srgbClr val="1b75bc"/>
                 </a:solidFill>
                 <a:uFillTx/>
                 <a:latin typeface="Arial"/>
@@ -29103,6 +29093,9 @@
               <a:t>https://github.com/markrojas/Springboard_DSCT/tree/master/capstone_projects/capstone_I</a:t>
             </a:r>
             <a:endParaRPr b="0" lang="en-US" sz="1400" spc="-1" strike="noStrike">
+              <a:solidFill>
+                <a:srgbClr val="000000"/>
+              </a:solidFill>
               <a:latin typeface="Arial"/>
             </a:endParaRPr>
           </a:p>
@@ -29119,6 +29112,9 @@
               </a:spcAft>
             </a:pPr>
             <a:endParaRPr b="0" lang="en-US" sz="1400" spc="-1" strike="noStrike">
+              <a:solidFill>
+                <a:srgbClr val="000000"/>
+              </a:solidFill>
               <a:latin typeface="Arial"/>
             </a:endParaRPr>
           </a:p>
@@ -29182,7 +29178,7 @@
         <p:spPr>
           <a:xfrm>
             <a:off x="601560" y="374760"/>
-            <a:ext cx="8091720" cy="761760"/>
+            <a:ext cx="8091360" cy="761400"/>
           </a:xfrm>
           <a:prstGeom prst="rect">
             <a:avLst/>
@@ -29233,7 +29229,7 @@
         <p:spPr>
           <a:xfrm>
             <a:off x="365760" y="2103120"/>
-            <a:ext cx="8411400" cy="2010600"/>
+            <a:ext cx="8411040" cy="2010240"/>
           </a:xfrm>
           <a:prstGeom prst="rect">
             <a:avLst/>
@@ -29254,7 +29250,7 @@
             <a:normAutofit/>
           </a:bodyPr>
           <a:p>
-            <a:pPr marL="432000" indent="-322920">
+            <a:pPr marL="432000" indent="-322560">
               <a:lnSpc>
                 <a:spcPct val="115000"/>
               </a:lnSpc>
@@ -29283,7 +29279,7 @@
             </a:endParaRPr>
           </a:p>
           <a:p>
-            <a:pPr marL="432000" indent="-322920">
+            <a:pPr marL="432000" indent="-322560">
               <a:lnSpc>
                 <a:spcPct val="115000"/>
               </a:lnSpc>
@@ -29312,7 +29308,7 @@
             </a:endParaRPr>
           </a:p>
           <a:p>
-            <a:pPr marL="432000" indent="-322920">
+            <a:pPr marL="432000" indent="-322560">
               <a:lnSpc>
                 <a:spcPct val="115000"/>
               </a:lnSpc>
@@ -29371,7 +29367,7 @@
         <p:spPr>
           <a:xfrm>
             <a:off x="984960" y="4589640"/>
-            <a:ext cx="7232040" cy="1111680"/>
+            <a:ext cx="7231680" cy="1111320"/>
           </a:xfrm>
           <a:prstGeom prst="rect">
             <a:avLst/>
@@ -29497,7 +29493,7 @@
         <p:spPr>
           <a:xfrm>
             <a:off x="601560" y="374760"/>
-            <a:ext cx="8091720" cy="761760"/>
+            <a:ext cx="8091360" cy="761400"/>
           </a:xfrm>
           <a:prstGeom prst="rect">
             <a:avLst/>
@@ -29572,7 +29568,7 @@
         <p:spPr>
           <a:xfrm>
             <a:off x="2028240" y="1645920"/>
-            <a:ext cx="6885360" cy="4847400"/>
+            <a:ext cx="6885000" cy="4847040"/>
           </a:xfrm>
           <a:prstGeom prst="rect">
             <a:avLst/>
@@ -29594,7 +29590,7 @@
         <p:spPr>
           <a:xfrm>
             <a:off x="2759760" y="4297680"/>
-            <a:ext cx="2010600" cy="364680"/>
+            <a:ext cx="2010240" cy="364320"/>
           </a:xfrm>
           <a:prstGeom prst="wedgeRoundRectCallout">
             <a:avLst>
@@ -29652,7 +29648,7 @@
         <p:spPr>
           <a:xfrm>
             <a:off x="145080" y="2276280"/>
-            <a:ext cx="1818000" cy="488880"/>
+            <a:ext cx="1817640" cy="488520"/>
           </a:xfrm>
           <a:prstGeom prst="rect">
             <a:avLst/>
@@ -29721,7 +29717,7 @@
         <p:spPr>
           <a:xfrm>
             <a:off x="289800" y="3653640"/>
-            <a:ext cx="1526760" cy="488880"/>
+            <a:ext cx="1526400" cy="488520"/>
           </a:xfrm>
           <a:prstGeom prst="rect">
             <a:avLst/>
@@ -29790,7 +29786,7 @@
         <p:spPr>
           <a:xfrm>
             <a:off x="40680" y="5113800"/>
-            <a:ext cx="1926000" cy="488880"/>
+            <a:ext cx="1925640" cy="488520"/>
           </a:xfrm>
           <a:prstGeom prst="rect">
             <a:avLst/>
@@ -29859,7 +29855,7 @@
         <p:spPr>
           <a:xfrm>
             <a:off x="8138160" y="5212080"/>
-            <a:ext cx="1005120" cy="913680"/>
+            <a:ext cx="1004760" cy="913320"/>
           </a:xfrm>
           <a:custGeom>
             <a:avLst/>
@@ -30087,7 +30083,7 @@
         <p:spPr>
           <a:xfrm>
             <a:off x="601560" y="374760"/>
-            <a:ext cx="8091720" cy="761760"/>
+            <a:ext cx="8091360" cy="761400"/>
           </a:xfrm>
           <a:prstGeom prst="rect">
             <a:avLst/>
@@ -30138,7 +30134,7 @@
         <p:spPr>
           <a:xfrm>
             <a:off x="457560" y="2269800"/>
-            <a:ext cx="8228160" cy="2422800"/>
+            <a:ext cx="8227800" cy="2422440"/>
           </a:xfrm>
           <a:prstGeom prst="rect">
             <a:avLst/>
@@ -30182,7 +30178,7 @@
             </a:endParaRPr>
           </a:p>
           <a:p>
-            <a:pPr lvl="7" marL="3456000" indent="-214920">
+            <a:pPr lvl="7" marL="3456000" indent="-214560">
               <a:lnSpc>
                 <a:spcPct val="150000"/>
               </a:lnSpc>
@@ -30211,7 +30207,7 @@
             </a:endParaRPr>
           </a:p>
           <a:p>
-            <a:pPr lvl="7" marL="3456000" indent="-214920">
+            <a:pPr lvl="7" marL="3456000" indent="-214560">
               <a:lnSpc>
                 <a:spcPct val="150000"/>
               </a:lnSpc>
@@ -30240,7 +30236,7 @@
             </a:endParaRPr>
           </a:p>
           <a:p>
-            <a:pPr lvl="7" marL="3456000" indent="-214920">
+            <a:pPr lvl="7" marL="3456000" indent="-214560">
               <a:lnSpc>
                 <a:spcPct val="150000"/>
               </a:lnSpc>
@@ -30269,7 +30265,7 @@
             </a:endParaRPr>
           </a:p>
           <a:p>
-            <a:pPr lvl="7" marL="3456000" indent="-214920">
+            <a:pPr lvl="7" marL="3456000" indent="-214560">
               <a:lnSpc>
                 <a:spcPct val="150000"/>
               </a:lnSpc>
@@ -30308,7 +30304,7 @@
         <p:spPr>
           <a:xfrm>
             <a:off x="2898000" y="3019320"/>
-            <a:ext cx="364680" cy="1644840"/>
+            <a:ext cx="364320" cy="1644480"/>
           </a:xfrm>
           <a:custGeom>
             <a:avLst/>
@@ -30373,7 +30369,7 @@
         <p:spPr>
           <a:xfrm>
             <a:off x="457560" y="3194640"/>
-            <a:ext cx="2193120" cy="1370520"/>
+            <a:ext cx="2192760" cy="1370160"/>
           </a:xfrm>
           <a:prstGeom prst="rect">
             <a:avLst/>
@@ -30501,7 +30497,7 @@
         <p:spPr>
           <a:xfrm>
             <a:off x="601560" y="374760"/>
-            <a:ext cx="8091720" cy="761760"/>
+            <a:ext cx="8091360" cy="761400"/>
           </a:xfrm>
           <a:prstGeom prst="rect">
             <a:avLst/>
@@ -30556,7 +30552,7 @@
         <p:spPr>
           <a:xfrm>
             <a:off x="91440" y="2011680"/>
-            <a:ext cx="8960040" cy="4753800"/>
+            <a:ext cx="8959680" cy="4753440"/>
           </a:xfrm>
           <a:prstGeom prst="rect">
             <a:avLst/>
@@ -30578,7 +30574,7 @@
         <p:spPr>
           <a:xfrm>
             <a:off x="4206240" y="1901880"/>
-            <a:ext cx="4845240" cy="4426560"/>
+            <a:ext cx="4844880" cy="4426200"/>
           </a:xfrm>
           <a:prstGeom prst="rect">
             <a:avLst/>
@@ -30807,7 +30803,7 @@
         <p:spPr>
           <a:xfrm>
             <a:off x="2128680" y="527760"/>
-            <a:ext cx="6515640" cy="761760"/>
+            <a:ext cx="6515280" cy="761400"/>
           </a:xfrm>
           <a:prstGeom prst="rect">
             <a:avLst/>
@@ -30856,7 +30852,7 @@
         <p:spPr>
           <a:xfrm>
             <a:off x="1645920" y="1596600"/>
-            <a:ext cx="6998400" cy="2974320"/>
+            <a:ext cx="6998040" cy="2973960"/>
           </a:xfrm>
           <a:prstGeom prst="rect">
             <a:avLst/>
@@ -30875,7 +30871,7 @@
         <p:txBody>
           <a:bodyPr lIns="90000" rIns="90000" tIns="45000" bIns="45000"/>
           <a:p>
-            <a:pPr marL="343080" indent="-341280">
+            <a:pPr marL="343080" indent="-340920">
               <a:lnSpc>
                 <a:spcPct val="100000"/>
               </a:lnSpc>
@@ -30916,7 +30912,7 @@
             </a:endParaRPr>
           </a:p>
           <a:p>
-            <a:pPr marL="343080" indent="-341280">
+            <a:pPr marL="343080" indent="-340920">
               <a:lnSpc>
                 <a:spcPct val="100000"/>
               </a:lnSpc>
@@ -30967,7 +30963,7 @@
         <p:spPr>
           <a:xfrm>
             <a:off x="1645920" y="4846320"/>
-            <a:ext cx="7039800" cy="1461960"/>
+            <a:ext cx="7039440" cy="1461600"/>
           </a:xfrm>
           <a:prstGeom prst="rect">
             <a:avLst/>
@@ -31065,7 +31061,7 @@
         <p:spPr>
           <a:xfrm>
             <a:off x="2128680" y="527760"/>
-            <a:ext cx="6515640" cy="761760"/>
+            <a:ext cx="6515280" cy="761400"/>
           </a:xfrm>
           <a:prstGeom prst="rect">
             <a:avLst/>
@@ -31114,7 +31110,7 @@
         <p:spPr>
           <a:xfrm>
             <a:off x="1371600" y="1860480"/>
-            <a:ext cx="3107880" cy="4519800"/>
+            <a:ext cx="3107520" cy="4519440"/>
           </a:xfrm>
           <a:prstGeom prst="rect">
             <a:avLst/>
@@ -31538,7 +31534,7 @@
         <p:spPr>
           <a:xfrm>
             <a:off x="4588560" y="1554480"/>
-            <a:ext cx="4343400" cy="5028120"/>
+            <a:ext cx="4343040" cy="5027760"/>
           </a:xfrm>
           <a:prstGeom prst="rect">
             <a:avLst/>

</xml_diff>